<commit_message>
Update for 2018 course
</commit_message>
<xml_diff>
--- a/docs/Using R as a Research Tool Pt 2.pptx
+++ b/docs/Using R as a Research Tool Pt 2.pptx
@@ -121,10 +121,6 @@
 </p:presentation>
 </file>
 
-<file path=ppt/revisionInfo.xml><?xml version="1.0" encoding="utf-8"?>
-<p1510:revInfo xmlns:a="http://schemas.openxmlformats.org/drawingml/2006/main" xmlns:r="http://schemas.openxmlformats.org/officeDocument/2006/relationships" xmlns:p1510="http://schemas.microsoft.com/office/powerpoint/2015/10/main"/>
-</file>
-
 <file path=ppt/slideLayouts/slideLayout1.xml><?xml version="1.0" encoding="utf-8"?>
 <p:sldLayout xmlns:a="http://schemas.openxmlformats.org/drawingml/2006/main" xmlns:r="http://schemas.openxmlformats.org/officeDocument/2006/relationships" xmlns:p="http://schemas.openxmlformats.org/presentationml/2006/main" type="title" preserve="1">
   <p:cSld name="Title Slide">
@@ -272,7 +268,7 @@
           <a:p>
             <a:fld id="{AE60CCC8-EC15-4607-84CA-55BA38351861}" type="datetimeFigureOut">
               <a:rPr lang="en-US" smtClean="0"/>
-              <a:t>11/28/2017</a:t>
+              <a:t>11/5/2018</a:t>
             </a:fld>
             <a:endParaRPr lang="en-US"/>
           </a:p>
@@ -470,7 +466,7 @@
           <a:p>
             <a:fld id="{AE60CCC8-EC15-4607-84CA-55BA38351861}" type="datetimeFigureOut">
               <a:rPr lang="en-US" smtClean="0"/>
-              <a:t>11/28/2017</a:t>
+              <a:t>11/5/2018</a:t>
             </a:fld>
             <a:endParaRPr lang="en-US"/>
           </a:p>
@@ -678,7 +674,7 @@
           <a:p>
             <a:fld id="{AE60CCC8-EC15-4607-84CA-55BA38351861}" type="datetimeFigureOut">
               <a:rPr lang="en-US" smtClean="0"/>
-              <a:t>11/28/2017</a:t>
+              <a:t>11/5/2018</a:t>
             </a:fld>
             <a:endParaRPr lang="en-US"/>
           </a:p>
@@ -876,7 +872,7 @@
           <a:p>
             <a:fld id="{AE60CCC8-EC15-4607-84CA-55BA38351861}" type="datetimeFigureOut">
               <a:rPr lang="en-US" smtClean="0"/>
-              <a:t>11/28/2017</a:t>
+              <a:t>11/5/2018</a:t>
             </a:fld>
             <a:endParaRPr lang="en-US"/>
           </a:p>
@@ -1151,7 +1147,7 @@
           <a:p>
             <a:fld id="{AE60CCC8-EC15-4607-84CA-55BA38351861}" type="datetimeFigureOut">
               <a:rPr lang="en-US" smtClean="0"/>
-              <a:t>11/28/2017</a:t>
+              <a:t>11/5/2018</a:t>
             </a:fld>
             <a:endParaRPr lang="en-US"/>
           </a:p>
@@ -1416,7 +1412,7 @@
           <a:p>
             <a:fld id="{AE60CCC8-EC15-4607-84CA-55BA38351861}" type="datetimeFigureOut">
               <a:rPr lang="en-US" smtClean="0"/>
-              <a:t>11/28/2017</a:t>
+              <a:t>11/5/2018</a:t>
             </a:fld>
             <a:endParaRPr lang="en-US"/>
           </a:p>
@@ -1828,7 +1824,7 @@
           <a:p>
             <a:fld id="{AE60CCC8-EC15-4607-84CA-55BA38351861}" type="datetimeFigureOut">
               <a:rPr lang="en-US" smtClean="0"/>
-              <a:t>11/28/2017</a:t>
+              <a:t>11/5/2018</a:t>
             </a:fld>
             <a:endParaRPr lang="en-US"/>
           </a:p>
@@ -1969,7 +1965,7 @@
           <a:p>
             <a:fld id="{AE60CCC8-EC15-4607-84CA-55BA38351861}" type="datetimeFigureOut">
               <a:rPr lang="en-US" smtClean="0"/>
-              <a:t>11/28/2017</a:t>
+              <a:t>11/5/2018</a:t>
             </a:fld>
             <a:endParaRPr lang="en-US"/>
           </a:p>
@@ -2082,7 +2078,7 @@
           <a:p>
             <a:fld id="{AE60CCC8-EC15-4607-84CA-55BA38351861}" type="datetimeFigureOut">
               <a:rPr lang="en-US" smtClean="0"/>
-              <a:t>11/28/2017</a:t>
+              <a:t>11/5/2018</a:t>
             </a:fld>
             <a:endParaRPr lang="en-US"/>
           </a:p>
@@ -2393,7 +2389,7 @@
           <a:p>
             <a:fld id="{AE60CCC8-EC15-4607-84CA-55BA38351861}" type="datetimeFigureOut">
               <a:rPr lang="en-US" smtClean="0"/>
-              <a:t>11/28/2017</a:t>
+              <a:t>11/5/2018</a:t>
             </a:fld>
             <a:endParaRPr lang="en-US"/>
           </a:p>
@@ -2681,7 +2677,7 @@
           <a:p>
             <a:fld id="{AE60CCC8-EC15-4607-84CA-55BA38351861}" type="datetimeFigureOut">
               <a:rPr lang="en-US" smtClean="0"/>
-              <a:t>11/28/2017</a:t>
+              <a:t>11/5/2018</a:t>
             </a:fld>
             <a:endParaRPr lang="en-US"/>
           </a:p>
@@ -2922,7 +2918,7 @@
           <a:p>
             <a:fld id="{AE60CCC8-EC15-4607-84CA-55BA38351861}" type="datetimeFigureOut">
               <a:rPr lang="en-US" smtClean="0"/>
-              <a:t>11/28/2017</a:t>
+              <a:t>11/5/2018</a:t>
             </a:fld>
             <a:endParaRPr lang="en-US"/>
           </a:p>
@@ -3403,15 +3399,23 @@
           <a:p>
             <a:r>
               <a:rPr lang="en-GB" b="1" dirty="0"/>
-              <a:t>NERC E3 DTP Training – 28</a:t>
-            </a:r>
-            <a:r>
-              <a:rPr lang="en-GB" b="1" baseline="30000" dirty="0"/>
+              <a:t>NERC E3 DTP Training </a:t>
+            </a:r>
+            <a:r>
+              <a:rPr lang="en-GB" b="1"/>
+              <a:t>– 6</a:t>
+            </a:r>
+            <a:r>
+              <a:rPr lang="en-GB" b="1" baseline="30000"/>
               <a:t>th</a:t>
             </a:r>
             <a:r>
+              <a:rPr lang="en-GB" b="1"/>
+              <a:t> </a:t>
+            </a:r>
+            <a:r>
               <a:rPr lang="en-GB" b="1" dirty="0"/>
-              <a:t> November</a:t>
+              <a:t>November</a:t>
             </a:r>
           </a:p>
           <a:p>

</xml_diff>

<commit_message>
Updated presentation for 2018 class
</commit_message>
<xml_diff>
--- a/docs/Using R as a Research Tool Pt 2.pptx
+++ b/docs/Using R as a Research Tool Pt 2.pptx
@@ -4,17 +4,24 @@
   <p:sldMasterIdLst>
     <p:sldMasterId id="2147483648" r:id="rId1"/>
   </p:sldMasterIdLst>
+  <p:notesMasterIdLst>
+    <p:notesMasterId r:id="rId16"/>
+  </p:notesMasterIdLst>
   <p:sldIdLst>
     <p:sldId id="256" r:id="rId2"/>
-    <p:sldId id="257" r:id="rId3"/>
-    <p:sldId id="258" r:id="rId4"/>
-    <p:sldId id="278" r:id="rId5"/>
-    <p:sldId id="280" r:id="rId6"/>
-    <p:sldId id="282" r:id="rId7"/>
-    <p:sldId id="281" r:id="rId8"/>
-    <p:sldId id="283" r:id="rId9"/>
-    <p:sldId id="284" r:id="rId10"/>
-    <p:sldId id="279" r:id="rId11"/>
+    <p:sldId id="286" r:id="rId3"/>
+    <p:sldId id="288" r:id="rId4"/>
+    <p:sldId id="257" r:id="rId5"/>
+    <p:sldId id="258" r:id="rId6"/>
+    <p:sldId id="278" r:id="rId7"/>
+    <p:sldId id="290" r:id="rId8"/>
+    <p:sldId id="291" r:id="rId9"/>
+    <p:sldId id="280" r:id="rId10"/>
+    <p:sldId id="289" r:id="rId11"/>
+    <p:sldId id="281" r:id="rId12"/>
+    <p:sldId id="283" r:id="rId13"/>
+    <p:sldId id="284" r:id="rId14"/>
+    <p:sldId id="279" r:id="rId15"/>
   </p:sldIdLst>
   <p:sldSz cx="12192000" cy="6858000"/>
   <p:notesSz cx="6858000" cy="9144000"/>
@@ -121,6 +128,483 @@
 </p:presentation>
 </file>
 
+<file path=ppt/notesMasters/notesMaster1.xml><?xml version="1.0" encoding="utf-8"?>
+<p:notesMaster xmlns:a="http://schemas.openxmlformats.org/drawingml/2006/main" xmlns:r="http://schemas.openxmlformats.org/officeDocument/2006/relationships" xmlns:p="http://schemas.openxmlformats.org/presentationml/2006/main">
+  <p:cSld>
+    <p:bg>
+      <p:bgRef idx="1001">
+        <a:schemeClr val="bg1"/>
+      </p:bgRef>
+    </p:bg>
+    <p:spTree>
+      <p:nvGrpSpPr>
+        <p:cNvPr id="1" name=""/>
+        <p:cNvGrpSpPr/>
+        <p:nvPr/>
+      </p:nvGrpSpPr>
+      <p:grpSpPr>
+        <a:xfrm>
+          <a:off x="0" y="0"/>
+          <a:ext cx="0" cy="0"/>
+          <a:chOff x="0" y="0"/>
+          <a:chExt cx="0" cy="0"/>
+        </a:xfrm>
+      </p:grpSpPr>
+      <p:sp>
+        <p:nvSpPr>
+          <p:cNvPr id="2" name="Header Placeholder 1"/>
+          <p:cNvSpPr>
+            <a:spLocks noGrp="1"/>
+          </p:cNvSpPr>
+          <p:nvPr>
+            <p:ph type="hdr" sz="quarter"/>
+          </p:nvPr>
+        </p:nvSpPr>
+        <p:spPr>
+          <a:xfrm>
+            <a:off x="0" y="0"/>
+            <a:ext cx="2971800" cy="458788"/>
+          </a:xfrm>
+          <a:prstGeom prst="rect">
+            <a:avLst/>
+          </a:prstGeom>
+        </p:spPr>
+        <p:txBody>
+          <a:bodyPr vert="horz" lIns="91440" tIns="45720" rIns="91440" bIns="45720" rtlCol="0"/>
+          <a:lstStyle>
+            <a:lvl1pPr algn="l">
+              <a:defRPr sz="1200"/>
+            </a:lvl1pPr>
+          </a:lstStyle>
+          <a:p>
+            <a:endParaRPr lang="en-US"/>
+          </a:p>
+        </p:txBody>
+      </p:sp>
+      <p:sp>
+        <p:nvSpPr>
+          <p:cNvPr id="3" name="Date Placeholder 2"/>
+          <p:cNvSpPr>
+            <a:spLocks noGrp="1"/>
+          </p:cNvSpPr>
+          <p:nvPr>
+            <p:ph type="dt" idx="1"/>
+          </p:nvPr>
+        </p:nvSpPr>
+        <p:spPr>
+          <a:xfrm>
+            <a:off x="3884613" y="0"/>
+            <a:ext cx="2971800" cy="458788"/>
+          </a:xfrm>
+          <a:prstGeom prst="rect">
+            <a:avLst/>
+          </a:prstGeom>
+        </p:spPr>
+        <p:txBody>
+          <a:bodyPr vert="horz" lIns="91440" tIns="45720" rIns="91440" bIns="45720" rtlCol="0"/>
+          <a:lstStyle>
+            <a:lvl1pPr algn="r">
+              <a:defRPr sz="1200"/>
+            </a:lvl1pPr>
+          </a:lstStyle>
+          <a:p>
+            <a:fld id="{5636FAFD-66AD-4CC3-9CC5-9E400943C6F1}" type="datetimeFigureOut">
+              <a:rPr lang="en-US" smtClean="0"/>
+              <a:t>11/6/2018</a:t>
+            </a:fld>
+            <a:endParaRPr lang="en-US"/>
+          </a:p>
+        </p:txBody>
+      </p:sp>
+      <p:sp>
+        <p:nvSpPr>
+          <p:cNvPr id="4" name="Slide Image Placeholder 3"/>
+          <p:cNvSpPr>
+            <a:spLocks noGrp="1" noRot="1" noChangeAspect="1"/>
+          </p:cNvSpPr>
+          <p:nvPr>
+            <p:ph type="sldImg" idx="2"/>
+          </p:nvPr>
+        </p:nvSpPr>
+        <p:spPr>
+          <a:xfrm>
+            <a:off x="685800" y="1143000"/>
+            <a:ext cx="5486400" cy="3086100"/>
+          </a:xfrm>
+          <a:prstGeom prst="rect">
+            <a:avLst/>
+          </a:prstGeom>
+          <a:noFill/>
+          <a:ln w="12700">
+            <a:solidFill>
+              <a:prstClr val="black"/>
+            </a:solidFill>
+          </a:ln>
+        </p:spPr>
+        <p:txBody>
+          <a:bodyPr vert="horz" lIns="91440" tIns="45720" rIns="91440" bIns="45720" rtlCol="0" anchor="ctr"/>
+          <a:lstStyle/>
+          <a:p>
+            <a:endParaRPr lang="en-US"/>
+          </a:p>
+        </p:txBody>
+      </p:sp>
+      <p:sp>
+        <p:nvSpPr>
+          <p:cNvPr id="5" name="Notes Placeholder 4"/>
+          <p:cNvSpPr>
+            <a:spLocks noGrp="1"/>
+          </p:cNvSpPr>
+          <p:nvPr>
+            <p:ph type="body" sz="quarter" idx="3"/>
+          </p:nvPr>
+        </p:nvSpPr>
+        <p:spPr>
+          <a:xfrm>
+            <a:off x="685800" y="4400550"/>
+            <a:ext cx="5486400" cy="3600450"/>
+          </a:xfrm>
+          <a:prstGeom prst="rect">
+            <a:avLst/>
+          </a:prstGeom>
+        </p:spPr>
+        <p:txBody>
+          <a:bodyPr vert="horz" lIns="91440" tIns="45720" rIns="91440" bIns="45720" rtlCol="0"/>
+          <a:lstStyle/>
+          <a:p>
+            <a:pPr lvl="0"/>
+            <a:r>
+              <a:rPr lang="en-US"/>
+              <a:t>Edit Master text styles</a:t>
+            </a:r>
+          </a:p>
+          <a:p>
+            <a:pPr lvl="1"/>
+            <a:r>
+              <a:rPr lang="en-US"/>
+              <a:t>Second level</a:t>
+            </a:r>
+          </a:p>
+          <a:p>
+            <a:pPr lvl="2"/>
+            <a:r>
+              <a:rPr lang="en-US"/>
+              <a:t>Third level</a:t>
+            </a:r>
+          </a:p>
+          <a:p>
+            <a:pPr lvl="3"/>
+            <a:r>
+              <a:rPr lang="en-US"/>
+              <a:t>Fourth level</a:t>
+            </a:r>
+          </a:p>
+          <a:p>
+            <a:pPr lvl="4"/>
+            <a:r>
+              <a:rPr lang="en-US"/>
+              <a:t>Fifth level</a:t>
+            </a:r>
+          </a:p>
+        </p:txBody>
+      </p:sp>
+      <p:sp>
+        <p:nvSpPr>
+          <p:cNvPr id="6" name="Footer Placeholder 5"/>
+          <p:cNvSpPr>
+            <a:spLocks noGrp="1"/>
+          </p:cNvSpPr>
+          <p:nvPr>
+            <p:ph type="ftr" sz="quarter" idx="4"/>
+          </p:nvPr>
+        </p:nvSpPr>
+        <p:spPr>
+          <a:xfrm>
+            <a:off x="0" y="8685213"/>
+            <a:ext cx="2971800" cy="458787"/>
+          </a:xfrm>
+          <a:prstGeom prst="rect">
+            <a:avLst/>
+          </a:prstGeom>
+        </p:spPr>
+        <p:txBody>
+          <a:bodyPr vert="horz" lIns="91440" tIns="45720" rIns="91440" bIns="45720" rtlCol="0" anchor="b"/>
+          <a:lstStyle>
+            <a:lvl1pPr algn="l">
+              <a:defRPr sz="1200"/>
+            </a:lvl1pPr>
+          </a:lstStyle>
+          <a:p>
+            <a:endParaRPr lang="en-US"/>
+          </a:p>
+        </p:txBody>
+      </p:sp>
+      <p:sp>
+        <p:nvSpPr>
+          <p:cNvPr id="7" name="Slide Number Placeholder 6"/>
+          <p:cNvSpPr>
+            <a:spLocks noGrp="1"/>
+          </p:cNvSpPr>
+          <p:nvPr>
+            <p:ph type="sldNum" sz="quarter" idx="5"/>
+          </p:nvPr>
+        </p:nvSpPr>
+        <p:spPr>
+          <a:xfrm>
+            <a:off x="3884613" y="8685213"/>
+            <a:ext cx="2971800" cy="458787"/>
+          </a:xfrm>
+          <a:prstGeom prst="rect">
+            <a:avLst/>
+          </a:prstGeom>
+        </p:spPr>
+        <p:txBody>
+          <a:bodyPr vert="horz" lIns="91440" tIns="45720" rIns="91440" bIns="45720" rtlCol="0" anchor="b"/>
+          <a:lstStyle>
+            <a:lvl1pPr algn="r">
+              <a:defRPr sz="1200"/>
+            </a:lvl1pPr>
+          </a:lstStyle>
+          <a:p>
+            <a:fld id="{E682E104-A904-45B5-9AC3-2E33E8DC6EC6}" type="slidenum">
+              <a:rPr lang="en-US" smtClean="0"/>
+              <a:t>‹#›</a:t>
+            </a:fld>
+            <a:endParaRPr lang="en-US"/>
+          </a:p>
+        </p:txBody>
+      </p:sp>
+    </p:spTree>
+    <p:extLst>
+      <p:ext uri="{BB962C8B-B14F-4D97-AF65-F5344CB8AC3E}">
+        <p14:creationId xmlns:p14="http://schemas.microsoft.com/office/powerpoint/2010/main" val="1929644697"/>
+      </p:ext>
+    </p:extLst>
+  </p:cSld>
+  <p:clrMap bg1="lt1" tx1="dk1" bg2="lt2" tx2="dk2" accent1="accent1" accent2="accent2" accent3="accent3" accent4="accent4" accent5="accent5" accent6="accent6" hlink="hlink" folHlink="folHlink"/>
+  <p:notesStyle>
+    <a:lvl1pPr marL="0" algn="l" defTabSz="914400" rtl="0" eaLnBrk="1" latinLnBrk="0" hangingPunct="1">
+      <a:defRPr sz="1200" kern="1200">
+        <a:solidFill>
+          <a:schemeClr val="tx1"/>
+        </a:solidFill>
+        <a:latin typeface="+mn-lt"/>
+        <a:ea typeface="+mn-ea"/>
+        <a:cs typeface="+mn-cs"/>
+      </a:defRPr>
+    </a:lvl1pPr>
+    <a:lvl2pPr marL="457200" algn="l" defTabSz="914400" rtl="0" eaLnBrk="1" latinLnBrk="0" hangingPunct="1">
+      <a:defRPr sz="1200" kern="1200">
+        <a:solidFill>
+          <a:schemeClr val="tx1"/>
+        </a:solidFill>
+        <a:latin typeface="+mn-lt"/>
+        <a:ea typeface="+mn-ea"/>
+        <a:cs typeface="+mn-cs"/>
+      </a:defRPr>
+    </a:lvl2pPr>
+    <a:lvl3pPr marL="914400" algn="l" defTabSz="914400" rtl="0" eaLnBrk="1" latinLnBrk="0" hangingPunct="1">
+      <a:defRPr sz="1200" kern="1200">
+        <a:solidFill>
+          <a:schemeClr val="tx1"/>
+        </a:solidFill>
+        <a:latin typeface="+mn-lt"/>
+        <a:ea typeface="+mn-ea"/>
+        <a:cs typeface="+mn-cs"/>
+      </a:defRPr>
+    </a:lvl3pPr>
+    <a:lvl4pPr marL="1371600" algn="l" defTabSz="914400" rtl="0" eaLnBrk="1" latinLnBrk="0" hangingPunct="1">
+      <a:defRPr sz="1200" kern="1200">
+        <a:solidFill>
+          <a:schemeClr val="tx1"/>
+        </a:solidFill>
+        <a:latin typeface="+mn-lt"/>
+        <a:ea typeface="+mn-ea"/>
+        <a:cs typeface="+mn-cs"/>
+      </a:defRPr>
+    </a:lvl4pPr>
+    <a:lvl5pPr marL="1828800" algn="l" defTabSz="914400" rtl="0" eaLnBrk="1" latinLnBrk="0" hangingPunct="1">
+      <a:defRPr sz="1200" kern="1200">
+        <a:solidFill>
+          <a:schemeClr val="tx1"/>
+        </a:solidFill>
+        <a:latin typeface="+mn-lt"/>
+        <a:ea typeface="+mn-ea"/>
+        <a:cs typeface="+mn-cs"/>
+      </a:defRPr>
+    </a:lvl5pPr>
+    <a:lvl6pPr marL="2286000" algn="l" defTabSz="914400" rtl="0" eaLnBrk="1" latinLnBrk="0" hangingPunct="1">
+      <a:defRPr sz="1200" kern="1200">
+        <a:solidFill>
+          <a:schemeClr val="tx1"/>
+        </a:solidFill>
+        <a:latin typeface="+mn-lt"/>
+        <a:ea typeface="+mn-ea"/>
+        <a:cs typeface="+mn-cs"/>
+      </a:defRPr>
+    </a:lvl6pPr>
+    <a:lvl7pPr marL="2743200" algn="l" defTabSz="914400" rtl="0" eaLnBrk="1" latinLnBrk="0" hangingPunct="1">
+      <a:defRPr sz="1200" kern="1200">
+        <a:solidFill>
+          <a:schemeClr val="tx1"/>
+        </a:solidFill>
+        <a:latin typeface="+mn-lt"/>
+        <a:ea typeface="+mn-ea"/>
+        <a:cs typeface="+mn-cs"/>
+      </a:defRPr>
+    </a:lvl7pPr>
+    <a:lvl8pPr marL="3200400" algn="l" defTabSz="914400" rtl="0" eaLnBrk="1" latinLnBrk="0" hangingPunct="1">
+      <a:defRPr sz="1200" kern="1200">
+        <a:solidFill>
+          <a:schemeClr val="tx1"/>
+        </a:solidFill>
+        <a:latin typeface="+mn-lt"/>
+        <a:ea typeface="+mn-ea"/>
+        <a:cs typeface="+mn-cs"/>
+      </a:defRPr>
+    </a:lvl8pPr>
+    <a:lvl9pPr marL="3657600" algn="l" defTabSz="914400" rtl="0" eaLnBrk="1" latinLnBrk="0" hangingPunct="1">
+      <a:defRPr sz="1200" kern="1200">
+        <a:solidFill>
+          <a:schemeClr val="tx1"/>
+        </a:solidFill>
+        <a:latin typeface="+mn-lt"/>
+        <a:ea typeface="+mn-ea"/>
+        <a:cs typeface="+mn-cs"/>
+      </a:defRPr>
+    </a:lvl9pPr>
+  </p:notesStyle>
+</p:notesMaster>
+</file>
+
+<file path=ppt/notesSlides/notesSlide1.xml><?xml version="1.0" encoding="utf-8"?>
+<p:notes xmlns:a="http://schemas.openxmlformats.org/drawingml/2006/main" xmlns:r="http://schemas.openxmlformats.org/officeDocument/2006/relationships" xmlns:p="http://schemas.openxmlformats.org/presentationml/2006/main">
+  <p:cSld>
+    <p:spTree>
+      <p:nvGrpSpPr>
+        <p:cNvPr id="1" name=""/>
+        <p:cNvGrpSpPr/>
+        <p:nvPr/>
+      </p:nvGrpSpPr>
+      <p:grpSpPr>
+        <a:xfrm>
+          <a:off x="0" y="0"/>
+          <a:ext cx="0" cy="0"/>
+          <a:chOff x="0" y="0"/>
+          <a:chExt cx="0" cy="0"/>
+        </a:xfrm>
+      </p:grpSpPr>
+      <p:sp>
+        <p:nvSpPr>
+          <p:cNvPr id="2" name="Slide Image Placeholder 1"/>
+          <p:cNvSpPr>
+            <a:spLocks noGrp="1" noRot="1" noChangeAspect="1"/>
+          </p:cNvSpPr>
+          <p:nvPr>
+            <p:ph type="sldImg"/>
+          </p:nvPr>
+        </p:nvSpPr>
+        <p:spPr/>
+      </p:sp>
+      <p:sp>
+        <p:nvSpPr>
+          <p:cNvPr id="3" name="Notes Placeholder 2"/>
+          <p:cNvSpPr>
+            <a:spLocks noGrp="1"/>
+          </p:cNvSpPr>
+          <p:nvPr>
+            <p:ph type="body" idx="1"/>
+          </p:nvPr>
+        </p:nvSpPr>
+        <p:spPr/>
+        <p:txBody>
+          <a:bodyPr/>
+          <a:lstStyle/>
+          <a:p>
+            <a:r>
+              <a:rPr lang="en-GB" sz="1200" b="0" i="0" kern="1200" dirty="0">
+                <a:solidFill>
+                  <a:schemeClr val="tx1"/>
+                </a:solidFill>
+                <a:effectLst/>
+                <a:latin typeface="+mn-lt"/>
+                <a:ea typeface="+mn-ea"/>
+                <a:cs typeface="+mn-cs"/>
+              </a:rPr>
+              <a:t>formatting words as bold or italic, adding images, and creating lists are just a few of the things we can do with Markdown. Mostly, Markdown is just regular text with a few non-alphabetic characters thrown in, like </a:t>
+            </a:r>
+            <a:r>
+              <a:rPr lang="en-GB" dirty="0"/>
+              <a:t>#</a:t>
+            </a:r>
+            <a:r>
+              <a:rPr lang="en-GB" sz="1200" b="0" i="0" kern="1200" dirty="0">
+                <a:solidFill>
+                  <a:schemeClr val="tx1"/>
+                </a:solidFill>
+                <a:effectLst/>
+                <a:latin typeface="+mn-lt"/>
+                <a:ea typeface="+mn-ea"/>
+                <a:cs typeface="+mn-cs"/>
+              </a:rPr>
+              <a:t> or </a:t>
+            </a:r>
+            <a:r>
+              <a:rPr lang="en-GB" dirty="0"/>
+              <a:t>*</a:t>
+            </a:r>
+            <a:r>
+              <a:rPr lang="en-GB" sz="1200" b="0" i="0" kern="1200" dirty="0">
+                <a:solidFill>
+                  <a:schemeClr val="tx1"/>
+                </a:solidFill>
+                <a:effectLst/>
+                <a:latin typeface="+mn-lt"/>
+                <a:ea typeface="+mn-ea"/>
+                <a:cs typeface="+mn-cs"/>
+              </a:rPr>
+              <a:t>.</a:t>
+            </a:r>
+            <a:endParaRPr lang="en-US" dirty="0"/>
+          </a:p>
+        </p:txBody>
+      </p:sp>
+      <p:sp>
+        <p:nvSpPr>
+          <p:cNvPr id="4" name="Slide Number Placeholder 3"/>
+          <p:cNvSpPr>
+            <a:spLocks noGrp="1"/>
+          </p:cNvSpPr>
+          <p:nvPr>
+            <p:ph type="sldNum" sz="quarter" idx="10"/>
+          </p:nvPr>
+        </p:nvSpPr>
+        <p:spPr/>
+        <p:txBody>
+          <a:bodyPr/>
+          <a:lstStyle/>
+          <a:p>
+            <a:fld id="{E682E104-A904-45B5-9AC3-2E33E8DC6EC6}" type="slidenum">
+              <a:rPr lang="en-US" smtClean="0"/>
+              <a:t>7</a:t>
+            </a:fld>
+            <a:endParaRPr lang="en-US"/>
+          </a:p>
+        </p:txBody>
+      </p:sp>
+    </p:spTree>
+    <p:extLst>
+      <p:ext uri="{BB962C8B-B14F-4D97-AF65-F5344CB8AC3E}">
+        <p14:creationId xmlns:p14="http://schemas.microsoft.com/office/powerpoint/2010/main" val="410384297"/>
+      </p:ext>
+    </p:extLst>
+  </p:cSld>
+  <p:clrMapOvr>
+    <a:masterClrMapping/>
+  </p:clrMapOvr>
+</p:notes>
+</file>
+
 <file path=ppt/slideLayouts/slideLayout1.xml><?xml version="1.0" encoding="utf-8"?>
 <p:sldLayout xmlns:a="http://schemas.openxmlformats.org/drawingml/2006/main" xmlns:r="http://schemas.openxmlformats.org/officeDocument/2006/relationships" xmlns:p="http://schemas.openxmlformats.org/presentationml/2006/main" type="title" preserve="1">
   <p:cSld name="Title Slide">
@@ -268,7 +752,7 @@
           <a:p>
             <a:fld id="{AE60CCC8-EC15-4607-84CA-55BA38351861}" type="datetimeFigureOut">
               <a:rPr lang="en-US" smtClean="0"/>
-              <a:t>11/5/2018</a:t>
+              <a:t>11/6/2018</a:t>
             </a:fld>
             <a:endParaRPr lang="en-US"/>
           </a:p>
@@ -466,7 +950,7 @@
           <a:p>
             <a:fld id="{AE60CCC8-EC15-4607-84CA-55BA38351861}" type="datetimeFigureOut">
               <a:rPr lang="en-US" smtClean="0"/>
-              <a:t>11/5/2018</a:t>
+              <a:t>11/6/2018</a:t>
             </a:fld>
             <a:endParaRPr lang="en-US"/>
           </a:p>
@@ -674,7 +1158,7 @@
           <a:p>
             <a:fld id="{AE60CCC8-EC15-4607-84CA-55BA38351861}" type="datetimeFigureOut">
               <a:rPr lang="en-US" smtClean="0"/>
-              <a:t>11/5/2018</a:t>
+              <a:t>11/6/2018</a:t>
             </a:fld>
             <a:endParaRPr lang="en-US"/>
           </a:p>
@@ -872,7 +1356,7 @@
           <a:p>
             <a:fld id="{AE60CCC8-EC15-4607-84CA-55BA38351861}" type="datetimeFigureOut">
               <a:rPr lang="en-US" smtClean="0"/>
-              <a:t>11/5/2018</a:t>
+              <a:t>11/6/2018</a:t>
             </a:fld>
             <a:endParaRPr lang="en-US"/>
           </a:p>
@@ -1147,7 +1631,7 @@
           <a:p>
             <a:fld id="{AE60CCC8-EC15-4607-84CA-55BA38351861}" type="datetimeFigureOut">
               <a:rPr lang="en-US" smtClean="0"/>
-              <a:t>11/5/2018</a:t>
+              <a:t>11/6/2018</a:t>
             </a:fld>
             <a:endParaRPr lang="en-US"/>
           </a:p>
@@ -1412,7 +1896,7 @@
           <a:p>
             <a:fld id="{AE60CCC8-EC15-4607-84CA-55BA38351861}" type="datetimeFigureOut">
               <a:rPr lang="en-US" smtClean="0"/>
-              <a:t>11/5/2018</a:t>
+              <a:t>11/6/2018</a:t>
             </a:fld>
             <a:endParaRPr lang="en-US"/>
           </a:p>
@@ -1824,7 +2308,7 @@
           <a:p>
             <a:fld id="{AE60CCC8-EC15-4607-84CA-55BA38351861}" type="datetimeFigureOut">
               <a:rPr lang="en-US" smtClean="0"/>
-              <a:t>11/5/2018</a:t>
+              <a:t>11/6/2018</a:t>
             </a:fld>
             <a:endParaRPr lang="en-US"/>
           </a:p>
@@ -1965,7 +2449,7 @@
           <a:p>
             <a:fld id="{AE60CCC8-EC15-4607-84CA-55BA38351861}" type="datetimeFigureOut">
               <a:rPr lang="en-US" smtClean="0"/>
-              <a:t>11/5/2018</a:t>
+              <a:t>11/6/2018</a:t>
             </a:fld>
             <a:endParaRPr lang="en-US"/>
           </a:p>
@@ -2078,7 +2562,7 @@
           <a:p>
             <a:fld id="{AE60CCC8-EC15-4607-84CA-55BA38351861}" type="datetimeFigureOut">
               <a:rPr lang="en-US" smtClean="0"/>
-              <a:t>11/5/2018</a:t>
+              <a:t>11/6/2018</a:t>
             </a:fld>
             <a:endParaRPr lang="en-US"/>
           </a:p>
@@ -2389,7 +2873,7 @@
           <a:p>
             <a:fld id="{AE60CCC8-EC15-4607-84CA-55BA38351861}" type="datetimeFigureOut">
               <a:rPr lang="en-US" smtClean="0"/>
-              <a:t>11/5/2018</a:t>
+              <a:t>11/6/2018</a:t>
             </a:fld>
             <a:endParaRPr lang="en-US"/>
           </a:p>
@@ -2677,7 +3161,7 @@
           <a:p>
             <a:fld id="{AE60CCC8-EC15-4607-84CA-55BA38351861}" type="datetimeFigureOut">
               <a:rPr lang="en-US" smtClean="0"/>
-              <a:t>11/5/2018</a:t>
+              <a:t>11/6/2018</a:t>
             </a:fld>
             <a:endParaRPr lang="en-US"/>
           </a:p>
@@ -2918,7 +3402,7 @@
           <a:p>
             <a:fld id="{AE60CCC8-EC15-4607-84CA-55BA38351861}" type="datetimeFigureOut">
               <a:rPr lang="en-US" smtClean="0"/>
-              <a:t>11/5/2018</a:t>
+              <a:t>11/6/2018</a:t>
             </a:fld>
             <a:endParaRPr lang="en-US"/>
           </a:p>
@@ -3556,7 +4040,7 @@
           <a:p>
             <a:r>
               <a:rPr lang="en-GB" dirty="0"/>
-              <a:t>Need help?</a:t>
+              <a:t>Today’s session:</a:t>
             </a:r>
             <a:endParaRPr lang="en-US" dirty="0"/>
           </a:p>
@@ -3591,30 +4075,27 @@
           <a:lstStyle/>
           <a:p>
             <a:r>
-              <a:rPr lang="en-US" b="1" dirty="0"/>
-              <a:t>ASK US!</a:t>
-            </a:r>
-          </a:p>
-          <a:p>
+              <a:rPr lang="en-US" dirty="0"/>
+              <a:t>Carry out basic statistics and </a:t>
+            </a:r>
+            <a:r>
+              <a:rPr lang="en-US" dirty="0" err="1"/>
+              <a:t>visualisations</a:t>
+            </a:r>
+            <a:r>
+              <a:rPr lang="en-US" dirty="0"/>
+              <a:t>, including:</a:t>
+            </a:r>
+          </a:p>
+          <a:p>
+            <a:pPr lvl="1"/>
             <a:endParaRPr lang="en-US" dirty="0"/>
           </a:p>
           <a:p>
+            <a:pPr lvl="1"/>
             <a:r>
               <a:rPr lang="en-US" dirty="0"/>
-              <a:t>Use </a:t>
-            </a:r>
-            <a:r>
-              <a:rPr lang="en-US" dirty="0">
-                <a:solidFill>
-                  <a:srgbClr val="FF0000"/>
-                </a:solidFill>
-                <a:latin typeface="Consolas" panose="020B0609020204030204" pitchFamily="49" charset="0"/>
-              </a:rPr>
-              <a:t>?</a:t>
-            </a:r>
-            <a:r>
-              <a:rPr lang="en-US" dirty="0"/>
-              <a:t>, </a:t>
+              <a:t>Chi-squared test with </a:t>
             </a:r>
             <a:r>
               <a:rPr lang="en-US" dirty="0" err="1">
@@ -3623,7 +4104,7 @@
                 </a:solidFill>
                 <a:latin typeface="Consolas" panose="020B0609020204030204" pitchFamily="49" charset="0"/>
               </a:rPr>
-              <a:t>str</a:t>
+              <a:t>chisq.test</a:t>
             </a:r>
             <a:r>
               <a:rPr lang="en-US" dirty="0">
@@ -3634,9 +4115,25 @@
               </a:rPr>
               <a:t>()</a:t>
             </a:r>
+          </a:p>
+          <a:p>
+            <a:pPr lvl="1"/>
+            <a:endParaRPr lang="en-US" dirty="0"/>
+          </a:p>
+          <a:p>
+            <a:pPr lvl="1"/>
             <a:r>
               <a:rPr lang="en-US" dirty="0"/>
-              <a:t>, </a:t>
+              <a:t>2-sample t-test with </a:t>
+            </a:r>
+            <a:r>
+              <a:rPr lang="en-US" dirty="0" err="1">
+                <a:solidFill>
+                  <a:srgbClr val="FF0000"/>
+                </a:solidFill>
+                <a:latin typeface="Consolas" panose="020B0609020204030204" pitchFamily="49" charset="0"/>
+              </a:rPr>
+              <a:t>t.test</a:t>
             </a:r>
             <a:r>
               <a:rPr lang="en-US" dirty="0">
@@ -3645,39 +4142,40 @@
                 </a:solidFill>
                 <a:latin typeface="Consolas" panose="020B0609020204030204" pitchFamily="49" charset="0"/>
               </a:rPr>
-              <a:t>glimpse()</a:t>
-            </a:r>
+              <a:t>()</a:t>
+            </a:r>
+          </a:p>
+          <a:p>
+            <a:pPr lvl="1"/>
+            <a:endParaRPr lang="en-US" dirty="0"/>
+          </a:p>
+          <a:p>
+            <a:pPr lvl="1"/>
             <a:r>
               <a:rPr lang="en-US" dirty="0"/>
-              <a:t> to explore functions and objects.</a:t>
-            </a:r>
-          </a:p>
-          <a:p>
-            <a:endParaRPr lang="en-GB" dirty="0"/>
-          </a:p>
-          <a:p>
-            <a:r>
-              <a:rPr lang="en-GB" dirty="0"/>
-              <a:t>C</a:t>
-            </a:r>
-            <a:r>
-              <a:rPr lang="en-US" dirty="0" err="1"/>
-              <a:t>oding</a:t>
-            </a:r>
-            <a:r>
-              <a:rPr lang="en-US" dirty="0"/>
-              <a:t> Club tutorials: </a:t>
+              <a:t>Linear regression with </a:t>
+            </a:r>
+            <a:r>
+              <a:rPr lang="en-US" dirty="0" err="1">
+                <a:solidFill>
+                  <a:srgbClr val="FF0000"/>
+                </a:solidFill>
+                <a:latin typeface="Consolas" panose="020B0609020204030204" pitchFamily="49" charset="0"/>
+              </a:rPr>
+              <a:t>lm</a:t>
             </a:r>
             <a:r>
               <a:rPr lang="en-US" dirty="0">
                 <a:solidFill>
                   <a:srgbClr val="FF0000"/>
                 </a:solidFill>
+                <a:latin typeface="Consolas" panose="020B0609020204030204" pitchFamily="49" charset="0"/>
               </a:rPr>
-              <a:t>https://ourcodingclub.github.io/tutorials/</a:t>
-            </a:r>
-          </a:p>
-          <a:p>
+              <a:t>()</a:t>
+            </a:r>
+          </a:p>
+          <a:p>
+            <a:pPr lvl="1"/>
             <a:endParaRPr lang="en-GB" dirty="0">
               <a:solidFill>
                 <a:srgbClr val="FF0000"/>
@@ -3687,21 +4185,25 @@
           </a:p>
           <a:p>
             <a:r>
-              <a:rPr lang="en-GB" dirty="0"/>
-              <a:t>Google &amp; </a:t>
-            </a:r>
-            <a:r>
-              <a:rPr lang="en-GB" dirty="0" err="1"/>
-              <a:t>StackOverflow</a:t>
-            </a:r>
-            <a:endParaRPr lang="en-US" dirty="0"/>
+              <a:rPr lang="en-US" dirty="0"/>
+              <a:t>Write, embed and render code and results into an HTML document.</a:t>
+            </a:r>
+          </a:p>
+          <a:p>
+            <a:pPr lvl="1"/>
+            <a:endParaRPr lang="en-US" dirty="0">
+              <a:solidFill>
+                <a:srgbClr val="FF0000"/>
+              </a:solidFill>
+              <a:latin typeface="Consolas" panose="020B0609020204030204" pitchFamily="49" charset="0"/>
+            </a:endParaRPr>
           </a:p>
         </p:txBody>
       </p:sp>
     </p:spTree>
     <p:extLst>
       <p:ext uri="{BB962C8B-B14F-4D97-AF65-F5344CB8AC3E}">
-        <p14:creationId xmlns:p14="http://schemas.microsoft.com/office/powerpoint/2010/main" val="1802352063"/>
+        <p14:creationId xmlns:p14="http://schemas.microsoft.com/office/powerpoint/2010/main" val="3980421116"/>
       </p:ext>
     </p:extLst>
   </p:cSld>
@@ -3711,853 +4213,7 @@
 </p:sld>
 </file>
 
-<file path=ppt/slides/slide2.xml><?xml version="1.0" encoding="utf-8"?>
-<p:sld xmlns:a="http://schemas.openxmlformats.org/drawingml/2006/main" xmlns:r="http://schemas.openxmlformats.org/officeDocument/2006/relationships" xmlns:p="http://schemas.openxmlformats.org/presentationml/2006/main">
-  <p:cSld>
-    <p:spTree>
-      <p:nvGrpSpPr>
-        <p:cNvPr id="1" name=""/>
-        <p:cNvGrpSpPr/>
-        <p:nvPr/>
-      </p:nvGrpSpPr>
-      <p:grpSpPr>
-        <a:xfrm>
-          <a:off x="0" y="0"/>
-          <a:ext cx="0" cy="0"/>
-          <a:chOff x="0" y="0"/>
-          <a:chExt cx="0" cy="0"/>
-        </a:xfrm>
-      </p:grpSpPr>
-      <p:sp>
-        <p:nvSpPr>
-          <p:cNvPr id="2" name="Title 1">
-            <a:extLst>
-              <a:ext uri="{FF2B5EF4-FFF2-40B4-BE49-F238E27FC236}">
-                <a16:creationId xmlns:a16="http://schemas.microsoft.com/office/drawing/2014/main" id="{FDF860D4-F5B5-41D8-B131-7367AE5C695F}"/>
-              </a:ext>
-            </a:extLst>
-          </p:cNvPr>
-          <p:cNvSpPr>
-            <a:spLocks noGrp="1"/>
-          </p:cNvSpPr>
-          <p:nvPr>
-            <p:ph type="title"/>
-          </p:nvPr>
-        </p:nvSpPr>
-        <p:spPr/>
-        <p:txBody>
-          <a:bodyPr/>
-          <a:lstStyle/>
-          <a:p>
-            <a:r>
-              <a:rPr lang="en-GB" dirty="0"/>
-              <a:t>Today’s session:</a:t>
-            </a:r>
-            <a:endParaRPr lang="en-US" dirty="0"/>
-          </a:p>
-        </p:txBody>
-      </p:sp>
-      <p:sp>
-        <p:nvSpPr>
-          <p:cNvPr id="3" name="Content Placeholder 2">
-            <a:extLst>
-              <a:ext uri="{FF2B5EF4-FFF2-40B4-BE49-F238E27FC236}">
-                <a16:creationId xmlns:a16="http://schemas.microsoft.com/office/drawing/2014/main" id="{8D5E960B-82BE-4065-BB48-580DFFC7EEF9}"/>
-              </a:ext>
-            </a:extLst>
-          </p:cNvPr>
-          <p:cNvSpPr>
-            <a:spLocks noGrp="1"/>
-          </p:cNvSpPr>
-          <p:nvPr>
-            <p:ph idx="1"/>
-          </p:nvPr>
-        </p:nvSpPr>
-        <p:spPr>
-          <a:xfrm>
-            <a:off x="721918" y="1750769"/>
-            <a:ext cx="10515600" cy="4351338"/>
-          </a:xfrm>
-        </p:spPr>
-        <p:txBody>
-          <a:bodyPr>
-            <a:normAutofit/>
-          </a:bodyPr>
-          <a:lstStyle/>
-          <a:p>
-            <a:r>
-              <a:rPr lang="en-US" dirty="0"/>
-              <a:t>Write, embed and render code and results into an HTML document.</a:t>
-            </a:r>
-          </a:p>
-          <a:p>
-            <a:endParaRPr lang="en-US" dirty="0"/>
-          </a:p>
-          <a:p>
-            <a:r>
-              <a:rPr lang="en-US" dirty="0"/>
-              <a:t>Carry out basic statistics and </a:t>
-            </a:r>
-            <a:r>
-              <a:rPr lang="en-US" dirty="0" err="1"/>
-              <a:t>visualisations</a:t>
-            </a:r>
-            <a:r>
-              <a:rPr lang="en-US" dirty="0"/>
-              <a:t>, including:</a:t>
-            </a:r>
-          </a:p>
-          <a:p>
-            <a:pPr lvl="1"/>
-            <a:endParaRPr lang="en-US" dirty="0"/>
-          </a:p>
-          <a:p>
-            <a:pPr lvl="1"/>
-            <a:r>
-              <a:rPr lang="en-US" dirty="0"/>
-              <a:t>Chi-squared test with </a:t>
-            </a:r>
-            <a:r>
-              <a:rPr lang="en-US" dirty="0" err="1">
-                <a:solidFill>
-                  <a:srgbClr val="FF0000"/>
-                </a:solidFill>
-                <a:latin typeface="Consolas" panose="020B0609020204030204" pitchFamily="49" charset="0"/>
-              </a:rPr>
-              <a:t>chisq.test</a:t>
-            </a:r>
-            <a:r>
-              <a:rPr lang="en-US" dirty="0">
-                <a:solidFill>
-                  <a:srgbClr val="FF0000"/>
-                </a:solidFill>
-                <a:latin typeface="Consolas" panose="020B0609020204030204" pitchFamily="49" charset="0"/>
-              </a:rPr>
-              <a:t>()</a:t>
-            </a:r>
-          </a:p>
-          <a:p>
-            <a:pPr lvl="1"/>
-            <a:endParaRPr lang="en-US" dirty="0"/>
-          </a:p>
-          <a:p>
-            <a:pPr lvl="1"/>
-            <a:r>
-              <a:rPr lang="en-US" dirty="0"/>
-              <a:t>2-sample t-test with </a:t>
-            </a:r>
-            <a:r>
-              <a:rPr lang="en-US" dirty="0" err="1">
-                <a:solidFill>
-                  <a:srgbClr val="FF0000"/>
-                </a:solidFill>
-                <a:latin typeface="Consolas" panose="020B0609020204030204" pitchFamily="49" charset="0"/>
-              </a:rPr>
-              <a:t>t.test</a:t>
-            </a:r>
-            <a:r>
-              <a:rPr lang="en-US" dirty="0">
-                <a:solidFill>
-                  <a:srgbClr val="FF0000"/>
-                </a:solidFill>
-                <a:latin typeface="Consolas" panose="020B0609020204030204" pitchFamily="49" charset="0"/>
-              </a:rPr>
-              <a:t>()</a:t>
-            </a:r>
-          </a:p>
-          <a:p>
-            <a:pPr lvl="1"/>
-            <a:endParaRPr lang="en-US" dirty="0"/>
-          </a:p>
-          <a:p>
-            <a:pPr lvl="1"/>
-            <a:r>
-              <a:rPr lang="en-US" dirty="0"/>
-              <a:t>Linear regression with </a:t>
-            </a:r>
-            <a:r>
-              <a:rPr lang="en-US" dirty="0" err="1">
-                <a:solidFill>
-                  <a:srgbClr val="FF0000"/>
-                </a:solidFill>
-                <a:latin typeface="Consolas" panose="020B0609020204030204" pitchFamily="49" charset="0"/>
-              </a:rPr>
-              <a:t>lm</a:t>
-            </a:r>
-            <a:r>
-              <a:rPr lang="en-US" dirty="0">
-                <a:solidFill>
-                  <a:srgbClr val="FF0000"/>
-                </a:solidFill>
-                <a:latin typeface="Consolas" panose="020B0609020204030204" pitchFamily="49" charset="0"/>
-              </a:rPr>
-              <a:t>()</a:t>
-            </a:r>
-          </a:p>
-        </p:txBody>
-      </p:sp>
-    </p:spTree>
-    <p:extLst>
-      <p:ext uri="{BB962C8B-B14F-4D97-AF65-F5344CB8AC3E}">
-        <p14:creationId xmlns:p14="http://schemas.microsoft.com/office/powerpoint/2010/main" val="3315054386"/>
-      </p:ext>
-    </p:extLst>
-  </p:cSld>
-  <p:clrMapOvr>
-    <a:masterClrMapping/>
-  </p:clrMapOvr>
-</p:sld>
-</file>
-
-<file path=ppt/slides/slide3.xml><?xml version="1.0" encoding="utf-8"?>
-<p:sld xmlns:a="http://schemas.openxmlformats.org/drawingml/2006/main" xmlns:r="http://schemas.openxmlformats.org/officeDocument/2006/relationships" xmlns:p="http://schemas.openxmlformats.org/presentationml/2006/main">
-  <p:cSld>
-    <p:spTree>
-      <p:nvGrpSpPr>
-        <p:cNvPr id="1" name=""/>
-        <p:cNvGrpSpPr/>
-        <p:nvPr/>
-      </p:nvGrpSpPr>
-      <p:grpSpPr>
-        <a:xfrm>
-          <a:off x="0" y="0"/>
-          <a:ext cx="0" cy="0"/>
-          <a:chOff x="0" y="0"/>
-          <a:chExt cx="0" cy="0"/>
-        </a:xfrm>
-      </p:grpSpPr>
-      <p:sp>
-        <p:nvSpPr>
-          <p:cNvPr id="15" name="Title 1">
-            <a:extLst>
-              <a:ext uri="{FF2B5EF4-FFF2-40B4-BE49-F238E27FC236}">
-                <a16:creationId xmlns:a16="http://schemas.microsoft.com/office/drawing/2014/main" id="{2224C1A7-59D9-49D3-938B-46B174E23D9A}"/>
-              </a:ext>
-            </a:extLst>
-          </p:cNvPr>
-          <p:cNvSpPr>
-            <a:spLocks noGrp="1"/>
-          </p:cNvSpPr>
-          <p:nvPr>
-            <p:ph type="title"/>
-          </p:nvPr>
-        </p:nvSpPr>
-        <p:spPr>
-          <a:xfrm>
-            <a:off x="838200" y="365125"/>
-            <a:ext cx="10515600" cy="1325563"/>
-          </a:xfrm>
-        </p:spPr>
-        <p:txBody>
-          <a:bodyPr/>
-          <a:lstStyle/>
-          <a:p>
-            <a:r>
-              <a:rPr lang="en-GB" dirty="0"/>
-              <a:t>Report writing</a:t>
-            </a:r>
-            <a:endParaRPr lang="en-US" dirty="0"/>
-          </a:p>
-        </p:txBody>
-      </p:sp>
-      <p:pic>
-        <p:nvPicPr>
-          <p:cNvPr id="16" name="Picture 15">
-            <a:extLst>
-              <a:ext uri="{FF2B5EF4-FFF2-40B4-BE49-F238E27FC236}">
-                <a16:creationId xmlns:a16="http://schemas.microsoft.com/office/drawing/2014/main" id="{68246553-9C67-497B-B0A8-22E9927DA231}"/>
-              </a:ext>
-            </a:extLst>
-          </p:cNvPr>
-          <p:cNvPicPr>
-            <a:picLocks noChangeAspect="1"/>
-          </p:cNvPicPr>
-          <p:nvPr/>
-        </p:nvPicPr>
-        <p:blipFill rotWithShape="1">
-          <a:blip r:embed="rId2"/>
-          <a:srcRect b="26134"/>
-          <a:stretch/>
-        </p:blipFill>
-        <p:spPr>
-          <a:xfrm>
-            <a:off x="674727" y="1932495"/>
-            <a:ext cx="5137517" cy="3789575"/>
-          </a:xfrm>
-          <a:prstGeom prst="rect">
-            <a:avLst/>
-          </a:prstGeom>
-          <a:ln>
-            <a:solidFill>
-              <a:schemeClr val="tx1"/>
-            </a:solidFill>
-          </a:ln>
-        </p:spPr>
-      </p:pic>
-      <p:sp>
-        <p:nvSpPr>
-          <p:cNvPr id="17" name="TextBox 16">
-            <a:extLst>
-              <a:ext uri="{FF2B5EF4-FFF2-40B4-BE49-F238E27FC236}">
-                <a16:creationId xmlns:a16="http://schemas.microsoft.com/office/drawing/2014/main" id="{9B145CEA-BA89-46DA-A569-C180F5CEFC80}"/>
-              </a:ext>
-            </a:extLst>
-          </p:cNvPr>
-          <p:cNvSpPr txBox="1"/>
-          <p:nvPr/>
-        </p:nvSpPr>
-        <p:spPr>
-          <a:xfrm>
-            <a:off x="1573951" y="5850755"/>
-            <a:ext cx="4072705" cy="523220"/>
-          </a:xfrm>
-          <a:prstGeom prst="rect">
-            <a:avLst/>
-          </a:prstGeom>
-          <a:noFill/>
-        </p:spPr>
-        <p:txBody>
-          <a:bodyPr wrap="square" rtlCol="0">
-            <a:spAutoFit/>
-          </a:bodyPr>
-          <a:lstStyle/>
-          <a:p>
-            <a:r>
-              <a:rPr lang="en-GB" sz="2800" dirty="0" err="1"/>
-              <a:t>LaTeX</a:t>
-            </a:r>
-            <a:r>
-              <a:rPr lang="en-GB" sz="2800" dirty="0"/>
-              <a:t> and R </a:t>
-            </a:r>
-            <a:r>
-              <a:rPr lang="en-GB" sz="2800" dirty="0" err="1"/>
-              <a:t>Sweave</a:t>
-            </a:r>
-            <a:endParaRPr lang="en-US" sz="2800" dirty="0"/>
-          </a:p>
-        </p:txBody>
-      </p:sp>
-      <p:pic>
-        <p:nvPicPr>
-          <p:cNvPr id="18" name="Picture 17">
-            <a:extLst>
-              <a:ext uri="{FF2B5EF4-FFF2-40B4-BE49-F238E27FC236}">
-                <a16:creationId xmlns:a16="http://schemas.microsoft.com/office/drawing/2014/main" id="{00B30231-A8F6-481F-9C33-A54E8FCF5298}"/>
-              </a:ext>
-            </a:extLst>
-          </p:cNvPr>
-          <p:cNvPicPr>
-            <a:picLocks noChangeAspect="1"/>
-          </p:cNvPicPr>
-          <p:nvPr/>
-        </p:nvPicPr>
-        <p:blipFill rotWithShape="1">
-          <a:blip r:embed="rId3"/>
-          <a:srcRect b="10567"/>
-          <a:stretch/>
-        </p:blipFill>
-        <p:spPr>
-          <a:xfrm>
-            <a:off x="6595640" y="1932495"/>
-            <a:ext cx="5089649" cy="3789575"/>
-          </a:xfrm>
-          <a:prstGeom prst="rect">
-            <a:avLst/>
-          </a:prstGeom>
-          <a:ln>
-            <a:solidFill>
-              <a:schemeClr val="tx1"/>
-            </a:solidFill>
-          </a:ln>
-        </p:spPr>
-      </p:pic>
-      <p:sp>
-        <p:nvSpPr>
-          <p:cNvPr id="19" name="TextBox 18">
-            <a:extLst>
-              <a:ext uri="{FF2B5EF4-FFF2-40B4-BE49-F238E27FC236}">
-                <a16:creationId xmlns:a16="http://schemas.microsoft.com/office/drawing/2014/main" id="{FF1AFC15-7EDE-4C6F-B9B8-53D559382FBE}"/>
-              </a:ext>
-            </a:extLst>
-          </p:cNvPr>
-          <p:cNvSpPr txBox="1"/>
-          <p:nvPr/>
-        </p:nvSpPr>
-        <p:spPr>
-          <a:xfrm>
-            <a:off x="7965261" y="5898741"/>
-            <a:ext cx="2568839" cy="523220"/>
-          </a:xfrm>
-          <a:prstGeom prst="rect">
-            <a:avLst/>
-          </a:prstGeom>
-          <a:noFill/>
-        </p:spPr>
-        <p:txBody>
-          <a:bodyPr wrap="square" rtlCol="0">
-            <a:spAutoFit/>
-          </a:bodyPr>
-          <a:lstStyle/>
-          <a:p>
-            <a:r>
-              <a:rPr lang="en-GB" sz="2800" dirty="0" err="1">
-                <a:solidFill>
-                  <a:srgbClr val="FF0000"/>
-                </a:solidFill>
-                <a:latin typeface="Consolas" panose="020B0609020204030204" pitchFamily="49" charset="0"/>
-              </a:rPr>
-              <a:t>knitr</a:t>
-            </a:r>
-            <a:r>
-              <a:rPr lang="en-GB" sz="2800" dirty="0"/>
-              <a:t> to HTML</a:t>
-            </a:r>
-            <a:endParaRPr lang="en-US" sz="2800" dirty="0"/>
-          </a:p>
-        </p:txBody>
-      </p:sp>
-      <p:sp>
-        <p:nvSpPr>
-          <p:cNvPr id="2" name="Rectangle 1">
-            <a:extLst>
-              <a:ext uri="{FF2B5EF4-FFF2-40B4-BE49-F238E27FC236}">
-                <a16:creationId xmlns:a16="http://schemas.microsoft.com/office/drawing/2014/main" id="{510B7804-09B5-40B9-BEBF-373E3BF39C3D}"/>
-              </a:ext>
-            </a:extLst>
-          </p:cNvPr>
-          <p:cNvSpPr/>
-          <p:nvPr/>
-        </p:nvSpPr>
-        <p:spPr>
-          <a:xfrm>
-            <a:off x="6326800" y="1437669"/>
-            <a:ext cx="5607968" cy="5243265"/>
-          </a:xfrm>
-          <a:prstGeom prst="rect">
-            <a:avLst/>
-          </a:prstGeom>
-          <a:noFill/>
-          <a:ln w="57150">
-            <a:solidFill>
-              <a:srgbClr val="FF0000"/>
-            </a:solidFill>
-          </a:ln>
-        </p:spPr>
-        <p:style>
-          <a:lnRef idx="2">
-            <a:schemeClr val="accent1">
-              <a:shade val="50000"/>
-            </a:schemeClr>
-          </a:lnRef>
-          <a:fillRef idx="1">
-            <a:schemeClr val="accent1"/>
-          </a:fillRef>
-          <a:effectRef idx="0">
-            <a:schemeClr val="accent1"/>
-          </a:effectRef>
-          <a:fontRef idx="minor">
-            <a:schemeClr val="lt1"/>
-          </a:fontRef>
-        </p:style>
-        <p:txBody>
-          <a:bodyPr rtlCol="0" anchor="ctr"/>
-          <a:lstStyle/>
-          <a:p>
-            <a:pPr algn="ctr"/>
-            <a:endParaRPr lang="en-US"/>
-          </a:p>
-        </p:txBody>
-      </p:sp>
-    </p:spTree>
-    <p:extLst>
-      <p:ext uri="{BB962C8B-B14F-4D97-AF65-F5344CB8AC3E}">
-        <p14:creationId xmlns:p14="http://schemas.microsoft.com/office/powerpoint/2010/main" val="3649852905"/>
-      </p:ext>
-    </p:extLst>
-  </p:cSld>
-  <p:clrMapOvr>
-    <a:masterClrMapping/>
-  </p:clrMapOvr>
-</p:sld>
-</file>
-
-<file path=ppt/slides/slide4.xml><?xml version="1.0" encoding="utf-8"?>
-<p:sld xmlns:a="http://schemas.openxmlformats.org/drawingml/2006/main" xmlns:r="http://schemas.openxmlformats.org/officeDocument/2006/relationships" xmlns:p="http://schemas.openxmlformats.org/presentationml/2006/main">
-  <p:cSld>
-    <p:spTree>
-      <p:nvGrpSpPr>
-        <p:cNvPr id="1" name=""/>
-        <p:cNvGrpSpPr/>
-        <p:nvPr/>
-      </p:nvGrpSpPr>
-      <p:grpSpPr>
-        <a:xfrm>
-          <a:off x="0" y="0"/>
-          <a:ext cx="0" cy="0"/>
-          <a:chOff x="0" y="0"/>
-          <a:chExt cx="0" cy="0"/>
-        </a:xfrm>
-      </p:grpSpPr>
-      <p:pic>
-        <p:nvPicPr>
-          <p:cNvPr id="4" name="Picture 3">
-            <a:extLst>
-              <a:ext uri="{FF2B5EF4-FFF2-40B4-BE49-F238E27FC236}">
-                <a16:creationId xmlns:a16="http://schemas.microsoft.com/office/drawing/2014/main" id="{B1DB2824-346C-4C48-99FF-E476DF27ADE9}"/>
-              </a:ext>
-            </a:extLst>
-          </p:cNvPr>
-          <p:cNvPicPr>
-            <a:picLocks noChangeAspect="1"/>
-          </p:cNvPicPr>
-          <p:nvPr/>
-        </p:nvPicPr>
-        <p:blipFill rotWithShape="1">
-          <a:blip r:embed="rId2"/>
-          <a:srcRect b="53040"/>
-          <a:stretch/>
-        </p:blipFill>
-        <p:spPr>
-          <a:xfrm>
-            <a:off x="1573929" y="126853"/>
-            <a:ext cx="9753004" cy="2637489"/>
-          </a:xfrm>
-          <a:prstGeom prst="rect">
-            <a:avLst/>
-          </a:prstGeom>
-        </p:spPr>
-      </p:pic>
-      <p:pic>
-        <p:nvPicPr>
-          <p:cNvPr id="5" name="Picture 4">
-            <a:extLst>
-              <a:ext uri="{FF2B5EF4-FFF2-40B4-BE49-F238E27FC236}">
-                <a16:creationId xmlns:a16="http://schemas.microsoft.com/office/drawing/2014/main" id="{84768084-9155-4EDA-8C16-DF48778BAB8B}"/>
-              </a:ext>
-            </a:extLst>
-          </p:cNvPr>
-          <p:cNvPicPr>
-            <a:picLocks noChangeAspect="1"/>
-          </p:cNvPicPr>
-          <p:nvPr/>
-        </p:nvPicPr>
-        <p:blipFill>
-          <a:blip r:embed="rId3"/>
-          <a:stretch>
-            <a:fillRect/>
-          </a:stretch>
-        </p:blipFill>
-        <p:spPr>
-          <a:xfrm>
-            <a:off x="1341651" y="5164932"/>
-            <a:ext cx="9402991" cy="1180816"/>
-          </a:xfrm>
-          <a:prstGeom prst="rect">
-            <a:avLst/>
-          </a:prstGeom>
-        </p:spPr>
-      </p:pic>
-      <p:pic>
-        <p:nvPicPr>
-          <p:cNvPr id="6" name="Picture 5">
-            <a:extLst>
-              <a:ext uri="{FF2B5EF4-FFF2-40B4-BE49-F238E27FC236}">
-                <a16:creationId xmlns:a16="http://schemas.microsoft.com/office/drawing/2014/main" id="{AC4841E9-75AD-4E56-9098-9BE84C8A5FC0}"/>
-              </a:ext>
-            </a:extLst>
-          </p:cNvPr>
-          <p:cNvPicPr>
-            <a:picLocks noChangeAspect="1"/>
-          </p:cNvPicPr>
-          <p:nvPr/>
-        </p:nvPicPr>
-        <p:blipFill rotWithShape="1">
-          <a:blip r:embed="rId2"/>
-          <a:srcRect t="68809"/>
-          <a:stretch/>
-        </p:blipFill>
-        <p:spPr>
-          <a:xfrm>
-            <a:off x="1409196" y="3088708"/>
-            <a:ext cx="9753004" cy="1751858"/>
-          </a:xfrm>
-          <a:prstGeom prst="rect">
-            <a:avLst/>
-          </a:prstGeom>
-        </p:spPr>
-      </p:pic>
-    </p:spTree>
-    <p:extLst>
-      <p:ext uri="{BB962C8B-B14F-4D97-AF65-F5344CB8AC3E}">
-        <p14:creationId xmlns:p14="http://schemas.microsoft.com/office/powerpoint/2010/main" val="4246052962"/>
-      </p:ext>
-    </p:extLst>
-  </p:cSld>
-  <p:clrMapOvr>
-    <a:masterClrMapping/>
-  </p:clrMapOvr>
-</p:sld>
-</file>
-
-<file path=ppt/slides/slide5.xml><?xml version="1.0" encoding="utf-8"?>
-<p:sld xmlns:a="http://schemas.openxmlformats.org/drawingml/2006/main" xmlns:r="http://schemas.openxmlformats.org/officeDocument/2006/relationships" xmlns:p="http://schemas.openxmlformats.org/presentationml/2006/main">
-  <p:cSld>
-    <p:spTree>
-      <p:nvGrpSpPr>
-        <p:cNvPr id="1" name=""/>
-        <p:cNvGrpSpPr/>
-        <p:nvPr/>
-      </p:nvGrpSpPr>
-      <p:grpSpPr>
-        <a:xfrm>
-          <a:off x="0" y="0"/>
-          <a:ext cx="0" cy="0"/>
-          <a:chOff x="0" y="0"/>
-          <a:chExt cx="0" cy="0"/>
-        </a:xfrm>
-      </p:grpSpPr>
-      <p:sp>
-        <p:nvSpPr>
-          <p:cNvPr id="2" name="Title 1">
-            <a:extLst>
-              <a:ext uri="{FF2B5EF4-FFF2-40B4-BE49-F238E27FC236}">
-                <a16:creationId xmlns:a16="http://schemas.microsoft.com/office/drawing/2014/main" id="{35AAFA69-BB11-43C7-BFC3-2D02E205D7D7}"/>
-              </a:ext>
-            </a:extLst>
-          </p:cNvPr>
-          <p:cNvSpPr>
-            <a:spLocks noGrp="1"/>
-          </p:cNvSpPr>
-          <p:nvPr>
-            <p:ph type="title"/>
-          </p:nvPr>
-        </p:nvSpPr>
-        <p:spPr/>
-        <p:txBody>
-          <a:bodyPr/>
-          <a:lstStyle/>
-          <a:p>
-            <a:r>
-              <a:rPr lang="en-GB" dirty="0"/>
-              <a:t>Worked example…</a:t>
-            </a:r>
-            <a:endParaRPr lang="en-US" dirty="0"/>
-          </a:p>
-        </p:txBody>
-      </p:sp>
-    </p:spTree>
-    <p:extLst>
-      <p:ext uri="{BB962C8B-B14F-4D97-AF65-F5344CB8AC3E}">
-        <p14:creationId xmlns:p14="http://schemas.microsoft.com/office/powerpoint/2010/main" val="3287177102"/>
-      </p:ext>
-    </p:extLst>
-  </p:cSld>
-  <p:clrMapOvr>
-    <a:masterClrMapping/>
-  </p:clrMapOvr>
-</p:sld>
-</file>
-
-<file path=ppt/slides/slide6.xml><?xml version="1.0" encoding="utf-8"?>
-<p:sld xmlns:a="http://schemas.openxmlformats.org/drawingml/2006/main" xmlns:r="http://schemas.openxmlformats.org/officeDocument/2006/relationships" xmlns:p="http://schemas.openxmlformats.org/presentationml/2006/main">
-  <p:cSld>
-    <p:spTree>
-      <p:nvGrpSpPr>
-        <p:cNvPr id="1" name=""/>
-        <p:cNvGrpSpPr/>
-        <p:nvPr/>
-      </p:nvGrpSpPr>
-      <p:grpSpPr>
-        <a:xfrm>
-          <a:off x="0" y="0"/>
-          <a:ext cx="0" cy="0"/>
-          <a:chOff x="0" y="0"/>
-          <a:chExt cx="0" cy="0"/>
-        </a:xfrm>
-      </p:grpSpPr>
-      <p:sp>
-        <p:nvSpPr>
-          <p:cNvPr id="2" name="Title 1">
-            <a:extLst>
-              <a:ext uri="{FF2B5EF4-FFF2-40B4-BE49-F238E27FC236}">
-                <a16:creationId xmlns:a16="http://schemas.microsoft.com/office/drawing/2014/main" id="{FDF860D4-F5B5-41D8-B131-7367AE5C695F}"/>
-              </a:ext>
-            </a:extLst>
-          </p:cNvPr>
-          <p:cNvSpPr>
-            <a:spLocks noGrp="1"/>
-          </p:cNvSpPr>
-          <p:nvPr>
-            <p:ph type="title"/>
-          </p:nvPr>
-        </p:nvSpPr>
-        <p:spPr/>
-        <p:txBody>
-          <a:bodyPr/>
-          <a:lstStyle/>
-          <a:p>
-            <a:r>
-              <a:rPr lang="en-GB" dirty="0"/>
-              <a:t>Today’s session:</a:t>
-            </a:r>
-            <a:endParaRPr lang="en-US" dirty="0"/>
-          </a:p>
-        </p:txBody>
-      </p:sp>
-      <p:sp>
-        <p:nvSpPr>
-          <p:cNvPr id="3" name="Content Placeholder 2">
-            <a:extLst>
-              <a:ext uri="{FF2B5EF4-FFF2-40B4-BE49-F238E27FC236}">
-                <a16:creationId xmlns:a16="http://schemas.microsoft.com/office/drawing/2014/main" id="{8D5E960B-82BE-4065-BB48-580DFFC7EEF9}"/>
-              </a:ext>
-            </a:extLst>
-          </p:cNvPr>
-          <p:cNvSpPr>
-            <a:spLocks noGrp="1"/>
-          </p:cNvSpPr>
-          <p:nvPr>
-            <p:ph idx="1"/>
-          </p:nvPr>
-        </p:nvSpPr>
-        <p:spPr>
-          <a:xfrm>
-            <a:off x="721918" y="1750769"/>
-            <a:ext cx="10515600" cy="4351338"/>
-          </a:xfrm>
-        </p:spPr>
-        <p:txBody>
-          <a:bodyPr>
-            <a:normAutofit/>
-          </a:bodyPr>
-          <a:lstStyle/>
-          <a:p>
-            <a:r>
-              <a:rPr lang="en-US" dirty="0"/>
-              <a:t>Write, embed and render code and results into an HTML document.</a:t>
-            </a:r>
-          </a:p>
-          <a:p>
-            <a:endParaRPr lang="en-US" dirty="0"/>
-          </a:p>
-          <a:p>
-            <a:r>
-              <a:rPr lang="en-US" dirty="0"/>
-              <a:t>Carry out basic statistics and </a:t>
-            </a:r>
-            <a:r>
-              <a:rPr lang="en-US" dirty="0" err="1"/>
-              <a:t>visualisations</a:t>
-            </a:r>
-            <a:r>
-              <a:rPr lang="en-US" dirty="0"/>
-              <a:t>, including:</a:t>
-            </a:r>
-          </a:p>
-          <a:p>
-            <a:pPr lvl="1"/>
-            <a:endParaRPr lang="en-US" dirty="0"/>
-          </a:p>
-          <a:p>
-            <a:pPr lvl="1"/>
-            <a:r>
-              <a:rPr lang="en-US" dirty="0"/>
-              <a:t>Chi-squared test with </a:t>
-            </a:r>
-            <a:r>
-              <a:rPr lang="en-US" dirty="0" err="1">
-                <a:solidFill>
-                  <a:srgbClr val="FF0000"/>
-                </a:solidFill>
-                <a:latin typeface="Consolas" panose="020B0609020204030204" pitchFamily="49" charset="0"/>
-              </a:rPr>
-              <a:t>chisq.test</a:t>
-            </a:r>
-            <a:r>
-              <a:rPr lang="en-US" dirty="0">
-                <a:solidFill>
-                  <a:srgbClr val="FF0000"/>
-                </a:solidFill>
-                <a:latin typeface="Consolas" panose="020B0609020204030204" pitchFamily="49" charset="0"/>
-              </a:rPr>
-              <a:t>()</a:t>
-            </a:r>
-          </a:p>
-          <a:p>
-            <a:pPr lvl="1"/>
-            <a:endParaRPr lang="en-US" dirty="0"/>
-          </a:p>
-          <a:p>
-            <a:pPr lvl="1"/>
-            <a:r>
-              <a:rPr lang="en-US" dirty="0"/>
-              <a:t>2-sample t-test with </a:t>
-            </a:r>
-            <a:r>
-              <a:rPr lang="en-US" dirty="0" err="1">
-                <a:solidFill>
-                  <a:srgbClr val="FF0000"/>
-                </a:solidFill>
-                <a:latin typeface="Consolas" panose="020B0609020204030204" pitchFamily="49" charset="0"/>
-              </a:rPr>
-              <a:t>t.test</a:t>
-            </a:r>
-            <a:r>
-              <a:rPr lang="en-US" dirty="0">
-                <a:solidFill>
-                  <a:srgbClr val="FF0000"/>
-                </a:solidFill>
-                <a:latin typeface="Consolas" panose="020B0609020204030204" pitchFamily="49" charset="0"/>
-              </a:rPr>
-              <a:t>()</a:t>
-            </a:r>
-          </a:p>
-          <a:p>
-            <a:pPr lvl="1"/>
-            <a:endParaRPr lang="en-US" dirty="0"/>
-          </a:p>
-          <a:p>
-            <a:pPr lvl="1"/>
-            <a:r>
-              <a:rPr lang="en-US" dirty="0"/>
-              <a:t>Linear regression with </a:t>
-            </a:r>
-            <a:r>
-              <a:rPr lang="en-US" dirty="0" err="1">
-                <a:solidFill>
-                  <a:srgbClr val="FF0000"/>
-                </a:solidFill>
-                <a:latin typeface="Consolas" panose="020B0609020204030204" pitchFamily="49" charset="0"/>
-              </a:rPr>
-              <a:t>lm</a:t>
-            </a:r>
-            <a:r>
-              <a:rPr lang="en-US" dirty="0">
-                <a:solidFill>
-                  <a:srgbClr val="FF0000"/>
-                </a:solidFill>
-                <a:latin typeface="Consolas" panose="020B0609020204030204" pitchFamily="49" charset="0"/>
-              </a:rPr>
-              <a:t>()</a:t>
-            </a:r>
-          </a:p>
-        </p:txBody>
-      </p:sp>
-    </p:spTree>
-    <p:extLst>
-      <p:ext uri="{BB962C8B-B14F-4D97-AF65-F5344CB8AC3E}">
-        <p14:creationId xmlns:p14="http://schemas.microsoft.com/office/powerpoint/2010/main" val="1703361147"/>
-      </p:ext>
-    </p:extLst>
-  </p:cSld>
-  <p:clrMapOvr>
-    <a:masterClrMapping/>
-  </p:clrMapOvr>
-</p:sld>
-</file>
-
-<file path=ppt/slides/slide7.xml><?xml version="1.0" encoding="utf-8"?>
+<file path=ppt/slides/slide11.xml><?xml version="1.0" encoding="utf-8"?>
 <p:sld xmlns:a="http://schemas.openxmlformats.org/drawingml/2006/main" xmlns:r="http://schemas.openxmlformats.org/officeDocument/2006/relationships" xmlns:p="http://schemas.openxmlformats.org/presentationml/2006/main">
   <p:cSld>
     <p:spTree>
@@ -4821,7 +4477,7 @@
 </p:sld>
 </file>
 
-<file path=ppt/slides/slide8.xml><?xml version="1.0" encoding="utf-8"?>
+<file path=ppt/slides/slide12.xml><?xml version="1.0" encoding="utf-8"?>
 <p:sld xmlns:a="http://schemas.openxmlformats.org/drawingml/2006/main" xmlns:r="http://schemas.openxmlformats.org/officeDocument/2006/relationships" xmlns:p="http://schemas.openxmlformats.org/presentationml/2006/main">
   <p:cSld>
     <p:spTree>
@@ -5130,7 +4786,7 @@
 </p:sld>
 </file>
 
-<file path=ppt/slides/slide9.xml><?xml version="1.0" encoding="utf-8"?>
+<file path=ppt/slides/slide13.xml><?xml version="1.0" encoding="utf-8"?>
 <p:sld xmlns:a="http://schemas.openxmlformats.org/drawingml/2006/main" xmlns:r="http://schemas.openxmlformats.org/officeDocument/2006/relationships" xmlns:p="http://schemas.openxmlformats.org/presentationml/2006/main">
   <p:cSld>
     <p:spTree>
@@ -5339,6 +4995,2847 @@
     <p:extLst>
       <p:ext uri="{BB962C8B-B14F-4D97-AF65-F5344CB8AC3E}">
         <p14:creationId xmlns:p14="http://schemas.microsoft.com/office/powerpoint/2010/main" val="1195731148"/>
+      </p:ext>
+    </p:extLst>
+  </p:cSld>
+  <p:clrMapOvr>
+    <a:masterClrMapping/>
+  </p:clrMapOvr>
+</p:sld>
+</file>
+
+<file path=ppt/slides/slide14.xml><?xml version="1.0" encoding="utf-8"?>
+<p:sld xmlns:a="http://schemas.openxmlformats.org/drawingml/2006/main" xmlns:r="http://schemas.openxmlformats.org/officeDocument/2006/relationships" xmlns:p="http://schemas.openxmlformats.org/presentationml/2006/main">
+  <p:cSld>
+    <p:spTree>
+      <p:nvGrpSpPr>
+        <p:cNvPr id="1" name=""/>
+        <p:cNvGrpSpPr/>
+        <p:nvPr/>
+      </p:nvGrpSpPr>
+      <p:grpSpPr>
+        <a:xfrm>
+          <a:off x="0" y="0"/>
+          <a:ext cx="0" cy="0"/>
+          <a:chOff x="0" y="0"/>
+          <a:chExt cx="0" cy="0"/>
+        </a:xfrm>
+      </p:grpSpPr>
+      <p:sp>
+        <p:nvSpPr>
+          <p:cNvPr id="2" name="Title 1">
+            <a:extLst>
+              <a:ext uri="{FF2B5EF4-FFF2-40B4-BE49-F238E27FC236}">
+                <a16:creationId xmlns:a16="http://schemas.microsoft.com/office/drawing/2014/main" id="{FDF860D4-F5B5-41D8-B131-7367AE5C695F}"/>
+              </a:ext>
+            </a:extLst>
+          </p:cNvPr>
+          <p:cNvSpPr>
+            <a:spLocks noGrp="1"/>
+          </p:cNvSpPr>
+          <p:nvPr>
+            <p:ph type="title"/>
+          </p:nvPr>
+        </p:nvSpPr>
+        <p:spPr/>
+        <p:txBody>
+          <a:bodyPr/>
+          <a:lstStyle/>
+          <a:p>
+            <a:r>
+              <a:rPr lang="en-GB" dirty="0"/>
+              <a:t>Need help?</a:t>
+            </a:r>
+            <a:endParaRPr lang="en-US" dirty="0"/>
+          </a:p>
+        </p:txBody>
+      </p:sp>
+      <p:sp>
+        <p:nvSpPr>
+          <p:cNvPr id="3" name="Content Placeholder 2">
+            <a:extLst>
+              <a:ext uri="{FF2B5EF4-FFF2-40B4-BE49-F238E27FC236}">
+                <a16:creationId xmlns:a16="http://schemas.microsoft.com/office/drawing/2014/main" id="{8D5E960B-82BE-4065-BB48-580DFFC7EEF9}"/>
+              </a:ext>
+            </a:extLst>
+          </p:cNvPr>
+          <p:cNvSpPr>
+            <a:spLocks noGrp="1"/>
+          </p:cNvSpPr>
+          <p:nvPr>
+            <p:ph idx="1"/>
+          </p:nvPr>
+        </p:nvSpPr>
+        <p:spPr>
+          <a:xfrm>
+            <a:off x="721918" y="1750769"/>
+            <a:ext cx="10515600" cy="4351338"/>
+          </a:xfrm>
+        </p:spPr>
+        <p:txBody>
+          <a:bodyPr>
+            <a:normAutofit lnSpcReduction="10000"/>
+          </a:bodyPr>
+          <a:lstStyle/>
+          <a:p>
+            <a:r>
+              <a:rPr lang="en-US" b="1" dirty="0"/>
+              <a:t>ASK US!</a:t>
+            </a:r>
+          </a:p>
+          <a:p>
+            <a:endParaRPr lang="en-US" dirty="0"/>
+          </a:p>
+          <a:p>
+            <a:r>
+              <a:rPr lang="en-US" dirty="0"/>
+              <a:t>Use </a:t>
+            </a:r>
+            <a:r>
+              <a:rPr lang="en-US" dirty="0">
+                <a:solidFill>
+                  <a:srgbClr val="FF0000"/>
+                </a:solidFill>
+                <a:latin typeface="Consolas" panose="020B0609020204030204" pitchFamily="49" charset="0"/>
+              </a:rPr>
+              <a:t>?</a:t>
+            </a:r>
+            <a:r>
+              <a:rPr lang="en-US" dirty="0"/>
+              <a:t>, </a:t>
+            </a:r>
+            <a:r>
+              <a:rPr lang="en-US" dirty="0" err="1">
+                <a:solidFill>
+                  <a:srgbClr val="FF0000"/>
+                </a:solidFill>
+                <a:latin typeface="Consolas" panose="020B0609020204030204" pitchFamily="49" charset="0"/>
+              </a:rPr>
+              <a:t>str</a:t>
+            </a:r>
+            <a:r>
+              <a:rPr lang="en-US" dirty="0">
+                <a:solidFill>
+                  <a:srgbClr val="FF0000"/>
+                </a:solidFill>
+                <a:latin typeface="Consolas" panose="020B0609020204030204" pitchFamily="49" charset="0"/>
+              </a:rPr>
+              <a:t>()</a:t>
+            </a:r>
+            <a:r>
+              <a:rPr lang="en-US" dirty="0"/>
+              <a:t>, </a:t>
+            </a:r>
+            <a:r>
+              <a:rPr lang="en-US" dirty="0">
+                <a:solidFill>
+                  <a:srgbClr val="FF0000"/>
+                </a:solidFill>
+                <a:latin typeface="Consolas" panose="020B0609020204030204" pitchFamily="49" charset="0"/>
+              </a:rPr>
+              <a:t>glimpse()</a:t>
+            </a:r>
+            <a:r>
+              <a:rPr lang="en-US" dirty="0"/>
+              <a:t> to explore functions and objects.</a:t>
+            </a:r>
+          </a:p>
+          <a:p>
+            <a:endParaRPr lang="en-GB" dirty="0"/>
+          </a:p>
+          <a:p>
+            <a:r>
+              <a:rPr lang="en-GB" dirty="0"/>
+              <a:t>C</a:t>
+            </a:r>
+            <a:r>
+              <a:rPr lang="en-US" dirty="0" err="1"/>
+              <a:t>oding</a:t>
+            </a:r>
+            <a:r>
+              <a:rPr lang="en-US" dirty="0"/>
+              <a:t> Club tutorials: </a:t>
+            </a:r>
+            <a:r>
+              <a:rPr lang="en-US" dirty="0">
+                <a:solidFill>
+                  <a:srgbClr val="FF0000"/>
+                </a:solidFill>
+              </a:rPr>
+              <a:t>https://ourcodingclub.github.io/tutorials/</a:t>
+            </a:r>
+          </a:p>
+          <a:p>
+            <a:endParaRPr lang="en-GB" dirty="0">
+              <a:solidFill>
+                <a:srgbClr val="FF0000"/>
+              </a:solidFill>
+              <a:latin typeface="Consolas" panose="020B0609020204030204" pitchFamily="49" charset="0"/>
+            </a:endParaRPr>
+          </a:p>
+          <a:p>
+            <a:r>
+              <a:rPr lang="en-GB" dirty="0"/>
+              <a:t>Google &amp; </a:t>
+            </a:r>
+            <a:r>
+              <a:rPr lang="en-GB" dirty="0" err="1"/>
+              <a:t>StackOverflow</a:t>
+            </a:r>
+            <a:endParaRPr lang="en-GB" dirty="0"/>
+          </a:p>
+          <a:p>
+            <a:endParaRPr lang="en-GB" dirty="0"/>
+          </a:p>
+          <a:p>
+            <a:r>
+              <a:rPr lang="en-GB" dirty="0"/>
+              <a:t>Feel free to write as a normal R script!</a:t>
+            </a:r>
+            <a:endParaRPr lang="en-US" dirty="0"/>
+          </a:p>
+        </p:txBody>
+      </p:sp>
+    </p:spTree>
+    <p:extLst>
+      <p:ext uri="{BB962C8B-B14F-4D97-AF65-F5344CB8AC3E}">
+        <p14:creationId xmlns:p14="http://schemas.microsoft.com/office/powerpoint/2010/main" val="1802352063"/>
+      </p:ext>
+    </p:extLst>
+  </p:cSld>
+  <p:clrMapOvr>
+    <a:masterClrMapping/>
+  </p:clrMapOvr>
+</p:sld>
+</file>
+
+<file path=ppt/slides/slide2.xml><?xml version="1.0" encoding="utf-8"?>
+<p:sld xmlns:a="http://schemas.openxmlformats.org/drawingml/2006/main" xmlns:r="http://schemas.openxmlformats.org/officeDocument/2006/relationships" xmlns:p="http://schemas.openxmlformats.org/presentationml/2006/main">
+  <p:cSld>
+    <p:spTree>
+      <p:nvGrpSpPr>
+        <p:cNvPr id="1" name=""/>
+        <p:cNvGrpSpPr/>
+        <p:nvPr/>
+      </p:nvGrpSpPr>
+      <p:grpSpPr>
+        <a:xfrm>
+          <a:off x="0" y="0"/>
+          <a:ext cx="0" cy="0"/>
+          <a:chOff x="0" y="0"/>
+          <a:chExt cx="0" cy="0"/>
+        </a:xfrm>
+      </p:grpSpPr>
+      <p:sp>
+        <p:nvSpPr>
+          <p:cNvPr id="2" name="Title 1">
+            <a:extLst>
+              <a:ext uri="{FF2B5EF4-FFF2-40B4-BE49-F238E27FC236}">
+                <a16:creationId xmlns:a16="http://schemas.microsoft.com/office/drawing/2014/main" id="{2E6673B7-74F6-4943-8558-975062CD5D1E}"/>
+              </a:ext>
+            </a:extLst>
+          </p:cNvPr>
+          <p:cNvSpPr>
+            <a:spLocks noGrp="1"/>
+          </p:cNvSpPr>
+          <p:nvPr>
+            <p:ph type="title"/>
+          </p:nvPr>
+        </p:nvSpPr>
+        <p:spPr>
+          <a:xfrm>
+            <a:off x="879669" y="0"/>
+            <a:ext cx="10515600" cy="1325563"/>
+          </a:xfrm>
+        </p:spPr>
+        <p:txBody>
+          <a:bodyPr/>
+          <a:lstStyle/>
+          <a:p>
+            <a:r>
+              <a:rPr lang="en-GB" dirty="0"/>
+              <a:t>Research project – typical workflow.</a:t>
+            </a:r>
+            <a:endParaRPr lang="en-US" dirty="0"/>
+          </a:p>
+        </p:txBody>
+      </p:sp>
+      <p:sp>
+        <p:nvSpPr>
+          <p:cNvPr id="6" name="Rectangle: Rounded Corners 5">
+            <a:extLst>
+              <a:ext uri="{FF2B5EF4-FFF2-40B4-BE49-F238E27FC236}">
+                <a16:creationId xmlns:a16="http://schemas.microsoft.com/office/drawing/2014/main" id="{342AEAB4-3D83-47F7-A0BE-49C8E212CB65}"/>
+              </a:ext>
+            </a:extLst>
+          </p:cNvPr>
+          <p:cNvSpPr/>
+          <p:nvPr/>
+        </p:nvSpPr>
+        <p:spPr>
+          <a:xfrm>
+            <a:off x="895908" y="2924175"/>
+            <a:ext cx="1800225" cy="1009650"/>
+          </a:xfrm>
+          <a:prstGeom prst="roundRect">
+            <a:avLst/>
+          </a:prstGeom>
+          <a:solidFill>
+            <a:schemeClr val="accent1">
+              <a:lumMod val="20000"/>
+              <a:lumOff val="80000"/>
+            </a:schemeClr>
+          </a:solidFill>
+          <a:ln w="28575"/>
+        </p:spPr>
+        <p:style>
+          <a:lnRef idx="2">
+            <a:schemeClr val="accent1">
+              <a:shade val="50000"/>
+            </a:schemeClr>
+          </a:lnRef>
+          <a:fillRef idx="1">
+            <a:schemeClr val="accent1"/>
+          </a:fillRef>
+          <a:effectRef idx="0">
+            <a:schemeClr val="accent1"/>
+          </a:effectRef>
+          <a:fontRef idx="minor">
+            <a:schemeClr val="lt1"/>
+          </a:fontRef>
+        </p:style>
+        <p:txBody>
+          <a:bodyPr rtlCol="0" anchor="ctr"/>
+          <a:lstStyle/>
+          <a:p>
+            <a:pPr algn="ctr"/>
+            <a:r>
+              <a:rPr lang="en-GB" sz="2400" dirty="0">
+                <a:solidFill>
+                  <a:schemeClr val="tx1"/>
+                </a:solidFill>
+              </a:rPr>
+              <a:t>Data</a:t>
+            </a:r>
+            <a:endParaRPr lang="en-US" sz="2400" dirty="0">
+              <a:solidFill>
+                <a:schemeClr val="tx1"/>
+              </a:solidFill>
+            </a:endParaRPr>
+          </a:p>
+        </p:txBody>
+      </p:sp>
+      <p:sp>
+        <p:nvSpPr>
+          <p:cNvPr id="8" name="Rectangle: Rounded Corners 7">
+            <a:extLst>
+              <a:ext uri="{FF2B5EF4-FFF2-40B4-BE49-F238E27FC236}">
+                <a16:creationId xmlns:a16="http://schemas.microsoft.com/office/drawing/2014/main" id="{C474549B-746E-4170-8461-145A01312FA2}"/>
+              </a:ext>
+            </a:extLst>
+          </p:cNvPr>
+          <p:cNvSpPr/>
+          <p:nvPr/>
+        </p:nvSpPr>
+        <p:spPr>
+          <a:xfrm>
+            <a:off x="3762654" y="1914525"/>
+            <a:ext cx="1899123" cy="1009650"/>
+          </a:xfrm>
+          <a:prstGeom prst="roundRect">
+            <a:avLst/>
+          </a:prstGeom>
+          <a:solidFill>
+            <a:schemeClr val="accent1">
+              <a:lumMod val="20000"/>
+              <a:lumOff val="80000"/>
+            </a:schemeClr>
+          </a:solidFill>
+          <a:ln w="28575"/>
+        </p:spPr>
+        <p:style>
+          <a:lnRef idx="2">
+            <a:schemeClr val="accent1">
+              <a:shade val="50000"/>
+            </a:schemeClr>
+          </a:lnRef>
+          <a:fillRef idx="1">
+            <a:schemeClr val="accent1"/>
+          </a:fillRef>
+          <a:effectRef idx="0">
+            <a:schemeClr val="accent1"/>
+          </a:effectRef>
+          <a:fontRef idx="minor">
+            <a:schemeClr val="lt1"/>
+          </a:fontRef>
+        </p:style>
+        <p:txBody>
+          <a:bodyPr rtlCol="0" anchor="ctr"/>
+          <a:lstStyle/>
+          <a:p>
+            <a:pPr algn="ctr"/>
+            <a:r>
+              <a:rPr lang="en-GB" sz="2400" dirty="0">
+                <a:solidFill>
+                  <a:schemeClr val="tx1"/>
+                </a:solidFill>
+              </a:rPr>
+              <a:t>Hypothesis</a:t>
+            </a:r>
+            <a:endParaRPr lang="en-US" sz="2400" dirty="0">
+              <a:solidFill>
+                <a:schemeClr val="tx1"/>
+              </a:solidFill>
+            </a:endParaRPr>
+          </a:p>
+        </p:txBody>
+      </p:sp>
+      <p:sp>
+        <p:nvSpPr>
+          <p:cNvPr id="11" name="Rectangle: Rounded Corners 10">
+            <a:extLst>
+              <a:ext uri="{FF2B5EF4-FFF2-40B4-BE49-F238E27FC236}">
+                <a16:creationId xmlns:a16="http://schemas.microsoft.com/office/drawing/2014/main" id="{7FCF8F18-24D2-4394-8441-097E6E5CEC50}"/>
+              </a:ext>
+            </a:extLst>
+          </p:cNvPr>
+          <p:cNvSpPr/>
+          <p:nvPr/>
+        </p:nvSpPr>
+        <p:spPr>
+          <a:xfrm>
+            <a:off x="3745149" y="3933825"/>
+            <a:ext cx="1899123" cy="1009650"/>
+          </a:xfrm>
+          <a:prstGeom prst="roundRect">
+            <a:avLst/>
+          </a:prstGeom>
+          <a:solidFill>
+            <a:schemeClr val="accent1">
+              <a:lumMod val="20000"/>
+              <a:lumOff val="80000"/>
+            </a:schemeClr>
+          </a:solidFill>
+          <a:ln w="28575"/>
+        </p:spPr>
+        <p:style>
+          <a:lnRef idx="2">
+            <a:schemeClr val="accent1">
+              <a:shade val="50000"/>
+            </a:schemeClr>
+          </a:lnRef>
+          <a:fillRef idx="1">
+            <a:schemeClr val="accent1"/>
+          </a:fillRef>
+          <a:effectRef idx="0">
+            <a:schemeClr val="accent1"/>
+          </a:effectRef>
+          <a:fontRef idx="minor">
+            <a:schemeClr val="lt1"/>
+          </a:fontRef>
+        </p:style>
+        <p:txBody>
+          <a:bodyPr rtlCol="0" anchor="ctr"/>
+          <a:lstStyle/>
+          <a:p>
+            <a:pPr algn="ctr"/>
+            <a:r>
+              <a:rPr lang="en-GB" sz="2400" dirty="0">
+                <a:solidFill>
+                  <a:schemeClr val="tx1"/>
+                </a:solidFill>
+              </a:rPr>
+              <a:t>Visualisation</a:t>
+            </a:r>
+            <a:endParaRPr lang="en-US" sz="2400" dirty="0">
+              <a:solidFill>
+                <a:schemeClr val="tx1"/>
+              </a:solidFill>
+            </a:endParaRPr>
+          </a:p>
+        </p:txBody>
+      </p:sp>
+      <p:sp>
+        <p:nvSpPr>
+          <p:cNvPr id="12" name="Rectangle: Rounded Corners 11">
+            <a:extLst>
+              <a:ext uri="{FF2B5EF4-FFF2-40B4-BE49-F238E27FC236}">
+                <a16:creationId xmlns:a16="http://schemas.microsoft.com/office/drawing/2014/main" id="{34181916-C64E-499A-8781-4AD3F7768229}"/>
+              </a:ext>
+            </a:extLst>
+          </p:cNvPr>
+          <p:cNvSpPr/>
+          <p:nvPr/>
+        </p:nvSpPr>
+        <p:spPr>
+          <a:xfrm>
+            <a:off x="6728298" y="2924175"/>
+            <a:ext cx="1800225" cy="1009650"/>
+          </a:xfrm>
+          <a:prstGeom prst="roundRect">
+            <a:avLst/>
+          </a:prstGeom>
+          <a:solidFill>
+            <a:schemeClr val="accent1">
+              <a:lumMod val="20000"/>
+              <a:lumOff val="80000"/>
+            </a:schemeClr>
+          </a:solidFill>
+          <a:ln w="28575"/>
+        </p:spPr>
+        <p:style>
+          <a:lnRef idx="2">
+            <a:schemeClr val="accent1">
+              <a:shade val="50000"/>
+            </a:schemeClr>
+          </a:lnRef>
+          <a:fillRef idx="1">
+            <a:schemeClr val="accent1"/>
+          </a:fillRef>
+          <a:effectRef idx="0">
+            <a:schemeClr val="accent1"/>
+          </a:effectRef>
+          <a:fontRef idx="minor">
+            <a:schemeClr val="lt1"/>
+          </a:fontRef>
+        </p:style>
+        <p:txBody>
+          <a:bodyPr rtlCol="0" anchor="ctr"/>
+          <a:lstStyle/>
+          <a:p>
+            <a:pPr algn="ctr"/>
+            <a:r>
+              <a:rPr lang="en-GB" sz="2400" dirty="0">
+                <a:solidFill>
+                  <a:schemeClr val="tx1"/>
+                </a:solidFill>
+              </a:rPr>
+              <a:t>Statistic</a:t>
+            </a:r>
+            <a:endParaRPr lang="en-US" sz="2400" dirty="0">
+              <a:solidFill>
+                <a:schemeClr val="tx1"/>
+              </a:solidFill>
+            </a:endParaRPr>
+          </a:p>
+        </p:txBody>
+      </p:sp>
+      <p:sp>
+        <p:nvSpPr>
+          <p:cNvPr id="13" name="Rectangle: Rounded Corners 12">
+            <a:extLst>
+              <a:ext uri="{FF2B5EF4-FFF2-40B4-BE49-F238E27FC236}">
+                <a16:creationId xmlns:a16="http://schemas.microsoft.com/office/drawing/2014/main" id="{03E99EBD-DE58-491F-9239-13F880B81269}"/>
+              </a:ext>
+            </a:extLst>
+          </p:cNvPr>
+          <p:cNvSpPr/>
+          <p:nvPr/>
+        </p:nvSpPr>
+        <p:spPr>
+          <a:xfrm>
+            <a:off x="9595044" y="2924175"/>
+            <a:ext cx="1800225" cy="1009650"/>
+          </a:xfrm>
+          <a:prstGeom prst="roundRect">
+            <a:avLst/>
+          </a:prstGeom>
+          <a:solidFill>
+            <a:schemeClr val="accent1">
+              <a:lumMod val="20000"/>
+              <a:lumOff val="80000"/>
+            </a:schemeClr>
+          </a:solidFill>
+          <a:ln w="28575"/>
+        </p:spPr>
+        <p:style>
+          <a:lnRef idx="2">
+            <a:schemeClr val="accent1">
+              <a:shade val="50000"/>
+            </a:schemeClr>
+          </a:lnRef>
+          <a:fillRef idx="1">
+            <a:schemeClr val="accent1"/>
+          </a:fillRef>
+          <a:effectRef idx="0">
+            <a:schemeClr val="accent1"/>
+          </a:effectRef>
+          <a:fontRef idx="minor">
+            <a:schemeClr val="lt1"/>
+          </a:fontRef>
+        </p:style>
+        <p:txBody>
+          <a:bodyPr rtlCol="0" anchor="ctr"/>
+          <a:lstStyle/>
+          <a:p>
+            <a:pPr algn="ctr"/>
+            <a:r>
+              <a:rPr lang="en-GB" sz="2400" dirty="0">
+                <a:solidFill>
+                  <a:schemeClr val="tx1"/>
+                </a:solidFill>
+              </a:rPr>
+              <a:t>Report</a:t>
+            </a:r>
+            <a:endParaRPr lang="en-US" sz="2400" dirty="0">
+              <a:solidFill>
+                <a:schemeClr val="tx1"/>
+              </a:solidFill>
+            </a:endParaRPr>
+          </a:p>
+        </p:txBody>
+      </p:sp>
+      <p:cxnSp>
+        <p:nvCxnSpPr>
+          <p:cNvPr id="15" name="Straight Arrow Connector 14">
+            <a:extLst>
+              <a:ext uri="{FF2B5EF4-FFF2-40B4-BE49-F238E27FC236}">
+                <a16:creationId xmlns:a16="http://schemas.microsoft.com/office/drawing/2014/main" id="{740D4B7F-0590-4700-BBE4-6A3668339B2D}"/>
+              </a:ext>
+            </a:extLst>
+          </p:cNvPr>
+          <p:cNvCxnSpPr>
+            <a:cxnSpLocks/>
+            <a:stCxn id="6" idx="3"/>
+            <a:endCxn id="8" idx="1"/>
+          </p:cNvCxnSpPr>
+          <p:nvPr/>
+        </p:nvCxnSpPr>
+        <p:spPr>
+          <a:xfrm flipV="1">
+            <a:off x="2696133" y="2419350"/>
+            <a:ext cx="1066521" cy="1009650"/>
+          </a:xfrm>
+          <a:prstGeom prst="straightConnector1">
+            <a:avLst/>
+          </a:prstGeom>
+          <a:ln w="57150">
+            <a:solidFill>
+              <a:schemeClr val="accent1">
+                <a:lumMod val="75000"/>
+              </a:schemeClr>
+            </a:solidFill>
+            <a:headEnd type="none" w="med" len="med"/>
+            <a:tailEnd type="triangle" w="med" len="med"/>
+          </a:ln>
+        </p:spPr>
+        <p:style>
+          <a:lnRef idx="1">
+            <a:schemeClr val="accent1"/>
+          </a:lnRef>
+          <a:fillRef idx="0">
+            <a:schemeClr val="accent1"/>
+          </a:fillRef>
+          <a:effectRef idx="0">
+            <a:schemeClr val="accent1"/>
+          </a:effectRef>
+          <a:fontRef idx="minor">
+            <a:schemeClr val="tx1"/>
+          </a:fontRef>
+        </p:style>
+      </p:cxnSp>
+      <p:cxnSp>
+        <p:nvCxnSpPr>
+          <p:cNvPr id="16" name="Straight Arrow Connector 15">
+            <a:extLst>
+              <a:ext uri="{FF2B5EF4-FFF2-40B4-BE49-F238E27FC236}">
+                <a16:creationId xmlns:a16="http://schemas.microsoft.com/office/drawing/2014/main" id="{D79B5414-63D2-48BE-9356-DA3A0CCE2364}"/>
+              </a:ext>
+            </a:extLst>
+          </p:cNvPr>
+          <p:cNvCxnSpPr>
+            <a:cxnSpLocks/>
+            <a:stCxn id="6" idx="3"/>
+            <a:endCxn id="11" idx="1"/>
+          </p:cNvCxnSpPr>
+          <p:nvPr/>
+        </p:nvCxnSpPr>
+        <p:spPr>
+          <a:xfrm>
+            <a:off x="2696133" y="3429000"/>
+            <a:ext cx="1049016" cy="1009650"/>
+          </a:xfrm>
+          <a:prstGeom prst="straightConnector1">
+            <a:avLst/>
+          </a:prstGeom>
+          <a:ln w="57150">
+            <a:solidFill>
+              <a:schemeClr val="accent1">
+                <a:lumMod val="75000"/>
+              </a:schemeClr>
+            </a:solidFill>
+            <a:headEnd type="none" w="med" len="med"/>
+            <a:tailEnd type="triangle" w="med" len="med"/>
+          </a:ln>
+        </p:spPr>
+        <p:style>
+          <a:lnRef idx="1">
+            <a:schemeClr val="accent1"/>
+          </a:lnRef>
+          <a:fillRef idx="0">
+            <a:schemeClr val="accent1"/>
+          </a:fillRef>
+          <a:effectRef idx="0">
+            <a:schemeClr val="accent1"/>
+          </a:effectRef>
+          <a:fontRef idx="minor">
+            <a:schemeClr val="tx1"/>
+          </a:fontRef>
+        </p:style>
+      </p:cxnSp>
+      <p:cxnSp>
+        <p:nvCxnSpPr>
+          <p:cNvPr id="19" name="Straight Arrow Connector 18">
+            <a:extLst>
+              <a:ext uri="{FF2B5EF4-FFF2-40B4-BE49-F238E27FC236}">
+                <a16:creationId xmlns:a16="http://schemas.microsoft.com/office/drawing/2014/main" id="{C938D43C-9722-4A41-B05D-AD5B14886B8B}"/>
+              </a:ext>
+            </a:extLst>
+          </p:cNvPr>
+          <p:cNvCxnSpPr>
+            <a:cxnSpLocks/>
+            <a:stCxn id="11" idx="3"/>
+            <a:endCxn id="12" idx="1"/>
+          </p:cNvCxnSpPr>
+          <p:nvPr/>
+        </p:nvCxnSpPr>
+        <p:spPr>
+          <a:xfrm flipV="1">
+            <a:off x="5644272" y="3429000"/>
+            <a:ext cx="1084026" cy="1009650"/>
+          </a:xfrm>
+          <a:prstGeom prst="straightConnector1">
+            <a:avLst/>
+          </a:prstGeom>
+          <a:ln w="57150">
+            <a:solidFill>
+              <a:schemeClr val="accent1">
+                <a:lumMod val="75000"/>
+              </a:schemeClr>
+            </a:solidFill>
+            <a:headEnd type="none" w="med" len="med"/>
+            <a:tailEnd type="triangle" w="med" len="med"/>
+          </a:ln>
+        </p:spPr>
+        <p:style>
+          <a:lnRef idx="1">
+            <a:schemeClr val="accent1"/>
+          </a:lnRef>
+          <a:fillRef idx="0">
+            <a:schemeClr val="accent1"/>
+          </a:fillRef>
+          <a:effectRef idx="0">
+            <a:schemeClr val="accent1"/>
+          </a:effectRef>
+          <a:fontRef idx="minor">
+            <a:schemeClr val="tx1"/>
+          </a:fontRef>
+        </p:style>
+      </p:cxnSp>
+      <p:cxnSp>
+        <p:nvCxnSpPr>
+          <p:cNvPr id="27" name="Straight Arrow Connector 26">
+            <a:extLst>
+              <a:ext uri="{FF2B5EF4-FFF2-40B4-BE49-F238E27FC236}">
+                <a16:creationId xmlns:a16="http://schemas.microsoft.com/office/drawing/2014/main" id="{D72ECBAB-3C8F-483D-8341-B9D0FBFA5825}"/>
+              </a:ext>
+            </a:extLst>
+          </p:cNvPr>
+          <p:cNvCxnSpPr>
+            <a:cxnSpLocks/>
+            <a:stCxn id="8" idx="3"/>
+            <a:endCxn id="12" idx="1"/>
+          </p:cNvCxnSpPr>
+          <p:nvPr/>
+        </p:nvCxnSpPr>
+        <p:spPr>
+          <a:xfrm>
+            <a:off x="5661777" y="2419350"/>
+            <a:ext cx="1066521" cy="1009650"/>
+          </a:xfrm>
+          <a:prstGeom prst="straightConnector1">
+            <a:avLst/>
+          </a:prstGeom>
+          <a:ln w="57150">
+            <a:solidFill>
+              <a:schemeClr val="accent1">
+                <a:lumMod val="75000"/>
+              </a:schemeClr>
+            </a:solidFill>
+            <a:headEnd type="none" w="med" len="med"/>
+            <a:tailEnd type="triangle" w="med" len="med"/>
+          </a:ln>
+        </p:spPr>
+        <p:style>
+          <a:lnRef idx="1">
+            <a:schemeClr val="accent1"/>
+          </a:lnRef>
+          <a:fillRef idx="0">
+            <a:schemeClr val="accent1"/>
+          </a:fillRef>
+          <a:effectRef idx="0">
+            <a:schemeClr val="accent1"/>
+          </a:effectRef>
+          <a:fontRef idx="minor">
+            <a:schemeClr val="tx1"/>
+          </a:fontRef>
+        </p:style>
+      </p:cxnSp>
+      <p:cxnSp>
+        <p:nvCxnSpPr>
+          <p:cNvPr id="30" name="Straight Arrow Connector 29">
+            <a:extLst>
+              <a:ext uri="{FF2B5EF4-FFF2-40B4-BE49-F238E27FC236}">
+                <a16:creationId xmlns:a16="http://schemas.microsoft.com/office/drawing/2014/main" id="{E13AC045-304F-4E21-8968-3AE4EFB8011E}"/>
+              </a:ext>
+            </a:extLst>
+          </p:cNvPr>
+          <p:cNvCxnSpPr>
+            <a:cxnSpLocks/>
+            <a:stCxn id="12" idx="3"/>
+            <a:endCxn id="13" idx="1"/>
+          </p:cNvCxnSpPr>
+          <p:nvPr/>
+        </p:nvCxnSpPr>
+        <p:spPr>
+          <a:xfrm>
+            <a:off x="8528523" y="3429000"/>
+            <a:ext cx="1066521" cy="0"/>
+          </a:xfrm>
+          <a:prstGeom prst="straightConnector1">
+            <a:avLst/>
+          </a:prstGeom>
+          <a:ln w="57150">
+            <a:solidFill>
+              <a:schemeClr val="accent1">
+                <a:lumMod val="75000"/>
+              </a:schemeClr>
+            </a:solidFill>
+            <a:headEnd type="none" w="med" len="med"/>
+            <a:tailEnd type="triangle" w="med" len="med"/>
+          </a:ln>
+        </p:spPr>
+        <p:style>
+          <a:lnRef idx="1">
+            <a:schemeClr val="accent1"/>
+          </a:lnRef>
+          <a:fillRef idx="0">
+            <a:schemeClr val="accent1"/>
+          </a:fillRef>
+          <a:effectRef idx="0">
+            <a:schemeClr val="accent1"/>
+          </a:effectRef>
+          <a:fontRef idx="minor">
+            <a:schemeClr val="tx1"/>
+          </a:fontRef>
+        </p:style>
+      </p:cxnSp>
+    </p:spTree>
+    <p:extLst>
+      <p:ext uri="{BB962C8B-B14F-4D97-AF65-F5344CB8AC3E}">
+        <p14:creationId xmlns:p14="http://schemas.microsoft.com/office/powerpoint/2010/main" val="1485601520"/>
+      </p:ext>
+    </p:extLst>
+  </p:cSld>
+  <p:clrMapOvr>
+    <a:masterClrMapping/>
+  </p:clrMapOvr>
+</p:sld>
+</file>
+
+<file path=ppt/slides/slide3.xml><?xml version="1.0" encoding="utf-8"?>
+<p:sld xmlns:a="http://schemas.openxmlformats.org/drawingml/2006/main" xmlns:r="http://schemas.openxmlformats.org/officeDocument/2006/relationships" xmlns:p="http://schemas.openxmlformats.org/presentationml/2006/main">
+  <p:cSld>
+    <p:spTree>
+      <p:nvGrpSpPr>
+        <p:cNvPr id="1" name=""/>
+        <p:cNvGrpSpPr/>
+        <p:nvPr/>
+      </p:nvGrpSpPr>
+      <p:grpSpPr>
+        <a:xfrm>
+          <a:off x="0" y="0"/>
+          <a:ext cx="0" cy="0"/>
+          <a:chOff x="0" y="0"/>
+          <a:chExt cx="0" cy="0"/>
+        </a:xfrm>
+      </p:grpSpPr>
+      <p:sp>
+        <p:nvSpPr>
+          <p:cNvPr id="6" name="Rectangle: Rounded Corners 5">
+            <a:extLst>
+              <a:ext uri="{FF2B5EF4-FFF2-40B4-BE49-F238E27FC236}">
+                <a16:creationId xmlns:a16="http://schemas.microsoft.com/office/drawing/2014/main" id="{342AEAB4-3D83-47F7-A0BE-49C8E212CB65}"/>
+              </a:ext>
+            </a:extLst>
+          </p:cNvPr>
+          <p:cNvSpPr/>
+          <p:nvPr/>
+        </p:nvSpPr>
+        <p:spPr>
+          <a:xfrm>
+            <a:off x="895908" y="2924175"/>
+            <a:ext cx="1800225" cy="1009650"/>
+          </a:xfrm>
+          <a:prstGeom prst="roundRect">
+            <a:avLst/>
+          </a:prstGeom>
+          <a:solidFill>
+            <a:schemeClr val="accent1">
+              <a:lumMod val="20000"/>
+              <a:lumOff val="80000"/>
+            </a:schemeClr>
+          </a:solidFill>
+          <a:ln w="28575"/>
+        </p:spPr>
+        <p:style>
+          <a:lnRef idx="2">
+            <a:schemeClr val="accent1">
+              <a:shade val="50000"/>
+            </a:schemeClr>
+          </a:lnRef>
+          <a:fillRef idx="1">
+            <a:schemeClr val="accent1"/>
+          </a:fillRef>
+          <a:effectRef idx="0">
+            <a:schemeClr val="accent1"/>
+          </a:effectRef>
+          <a:fontRef idx="minor">
+            <a:schemeClr val="lt1"/>
+          </a:fontRef>
+        </p:style>
+        <p:txBody>
+          <a:bodyPr rtlCol="0" anchor="ctr"/>
+          <a:lstStyle/>
+          <a:p>
+            <a:pPr algn="ctr"/>
+            <a:r>
+              <a:rPr lang="en-GB" sz="2400" dirty="0">
+                <a:solidFill>
+                  <a:schemeClr val="tx1"/>
+                </a:solidFill>
+              </a:rPr>
+              <a:t>Data</a:t>
+            </a:r>
+            <a:endParaRPr lang="en-US" sz="2400" dirty="0">
+              <a:solidFill>
+                <a:schemeClr val="tx1"/>
+              </a:solidFill>
+            </a:endParaRPr>
+          </a:p>
+        </p:txBody>
+      </p:sp>
+      <p:sp>
+        <p:nvSpPr>
+          <p:cNvPr id="8" name="Rectangle: Rounded Corners 7">
+            <a:extLst>
+              <a:ext uri="{FF2B5EF4-FFF2-40B4-BE49-F238E27FC236}">
+                <a16:creationId xmlns:a16="http://schemas.microsoft.com/office/drawing/2014/main" id="{C474549B-746E-4170-8461-145A01312FA2}"/>
+              </a:ext>
+            </a:extLst>
+          </p:cNvPr>
+          <p:cNvSpPr/>
+          <p:nvPr/>
+        </p:nvSpPr>
+        <p:spPr>
+          <a:xfrm>
+            <a:off x="3762654" y="1914525"/>
+            <a:ext cx="1899123" cy="1009650"/>
+          </a:xfrm>
+          <a:prstGeom prst="roundRect">
+            <a:avLst/>
+          </a:prstGeom>
+          <a:solidFill>
+            <a:schemeClr val="accent1">
+              <a:lumMod val="20000"/>
+              <a:lumOff val="80000"/>
+            </a:schemeClr>
+          </a:solidFill>
+          <a:ln w="28575"/>
+        </p:spPr>
+        <p:style>
+          <a:lnRef idx="2">
+            <a:schemeClr val="accent1">
+              <a:shade val="50000"/>
+            </a:schemeClr>
+          </a:lnRef>
+          <a:fillRef idx="1">
+            <a:schemeClr val="accent1"/>
+          </a:fillRef>
+          <a:effectRef idx="0">
+            <a:schemeClr val="accent1"/>
+          </a:effectRef>
+          <a:fontRef idx="minor">
+            <a:schemeClr val="lt1"/>
+          </a:fontRef>
+        </p:style>
+        <p:txBody>
+          <a:bodyPr rtlCol="0" anchor="ctr"/>
+          <a:lstStyle/>
+          <a:p>
+            <a:pPr algn="ctr"/>
+            <a:r>
+              <a:rPr lang="en-GB" sz="2400" dirty="0">
+                <a:solidFill>
+                  <a:schemeClr val="tx1"/>
+                </a:solidFill>
+              </a:rPr>
+              <a:t>Hypothesis</a:t>
+            </a:r>
+            <a:endParaRPr lang="en-US" sz="2400" dirty="0">
+              <a:solidFill>
+                <a:schemeClr val="tx1"/>
+              </a:solidFill>
+            </a:endParaRPr>
+          </a:p>
+        </p:txBody>
+      </p:sp>
+      <p:sp>
+        <p:nvSpPr>
+          <p:cNvPr id="12" name="Rectangle: Rounded Corners 11">
+            <a:extLst>
+              <a:ext uri="{FF2B5EF4-FFF2-40B4-BE49-F238E27FC236}">
+                <a16:creationId xmlns:a16="http://schemas.microsoft.com/office/drawing/2014/main" id="{34181916-C64E-499A-8781-4AD3F7768229}"/>
+              </a:ext>
+            </a:extLst>
+          </p:cNvPr>
+          <p:cNvSpPr/>
+          <p:nvPr/>
+        </p:nvSpPr>
+        <p:spPr>
+          <a:xfrm>
+            <a:off x="6728298" y="2924175"/>
+            <a:ext cx="1800225" cy="1009650"/>
+          </a:xfrm>
+          <a:prstGeom prst="roundRect">
+            <a:avLst/>
+          </a:prstGeom>
+          <a:solidFill>
+            <a:schemeClr val="accent1">
+              <a:lumMod val="20000"/>
+              <a:lumOff val="80000"/>
+            </a:schemeClr>
+          </a:solidFill>
+          <a:ln w="28575"/>
+        </p:spPr>
+        <p:style>
+          <a:lnRef idx="2">
+            <a:schemeClr val="accent1">
+              <a:shade val="50000"/>
+            </a:schemeClr>
+          </a:lnRef>
+          <a:fillRef idx="1">
+            <a:schemeClr val="accent1"/>
+          </a:fillRef>
+          <a:effectRef idx="0">
+            <a:schemeClr val="accent1"/>
+          </a:effectRef>
+          <a:fontRef idx="minor">
+            <a:schemeClr val="lt1"/>
+          </a:fontRef>
+        </p:style>
+        <p:txBody>
+          <a:bodyPr rtlCol="0" anchor="ctr"/>
+          <a:lstStyle/>
+          <a:p>
+            <a:pPr algn="ctr"/>
+            <a:r>
+              <a:rPr lang="en-GB" sz="2400" dirty="0">
+                <a:solidFill>
+                  <a:schemeClr val="tx1"/>
+                </a:solidFill>
+              </a:rPr>
+              <a:t>Statistic</a:t>
+            </a:r>
+            <a:endParaRPr lang="en-US" sz="2400" dirty="0">
+              <a:solidFill>
+                <a:schemeClr val="tx1"/>
+              </a:solidFill>
+            </a:endParaRPr>
+          </a:p>
+        </p:txBody>
+      </p:sp>
+      <p:sp>
+        <p:nvSpPr>
+          <p:cNvPr id="13" name="Rectangle: Rounded Corners 12">
+            <a:extLst>
+              <a:ext uri="{FF2B5EF4-FFF2-40B4-BE49-F238E27FC236}">
+                <a16:creationId xmlns:a16="http://schemas.microsoft.com/office/drawing/2014/main" id="{03E99EBD-DE58-491F-9239-13F880B81269}"/>
+              </a:ext>
+            </a:extLst>
+          </p:cNvPr>
+          <p:cNvSpPr/>
+          <p:nvPr/>
+        </p:nvSpPr>
+        <p:spPr>
+          <a:xfrm>
+            <a:off x="9595044" y="2924175"/>
+            <a:ext cx="1800225" cy="1009650"/>
+          </a:xfrm>
+          <a:prstGeom prst="roundRect">
+            <a:avLst/>
+          </a:prstGeom>
+          <a:solidFill>
+            <a:schemeClr val="accent1">
+              <a:lumMod val="20000"/>
+              <a:lumOff val="80000"/>
+            </a:schemeClr>
+          </a:solidFill>
+          <a:ln w="28575"/>
+        </p:spPr>
+        <p:style>
+          <a:lnRef idx="2">
+            <a:schemeClr val="accent1">
+              <a:shade val="50000"/>
+            </a:schemeClr>
+          </a:lnRef>
+          <a:fillRef idx="1">
+            <a:schemeClr val="accent1"/>
+          </a:fillRef>
+          <a:effectRef idx="0">
+            <a:schemeClr val="accent1"/>
+          </a:effectRef>
+          <a:fontRef idx="minor">
+            <a:schemeClr val="lt1"/>
+          </a:fontRef>
+        </p:style>
+        <p:txBody>
+          <a:bodyPr rtlCol="0" anchor="ctr"/>
+          <a:lstStyle/>
+          <a:p>
+            <a:pPr algn="ctr"/>
+            <a:r>
+              <a:rPr lang="en-GB" sz="2400" dirty="0">
+                <a:solidFill>
+                  <a:schemeClr val="tx1"/>
+                </a:solidFill>
+              </a:rPr>
+              <a:t>Report</a:t>
+            </a:r>
+            <a:endParaRPr lang="en-US" sz="2400" dirty="0">
+              <a:solidFill>
+                <a:schemeClr val="tx1"/>
+              </a:solidFill>
+            </a:endParaRPr>
+          </a:p>
+        </p:txBody>
+      </p:sp>
+      <p:cxnSp>
+        <p:nvCxnSpPr>
+          <p:cNvPr id="15" name="Straight Arrow Connector 14">
+            <a:extLst>
+              <a:ext uri="{FF2B5EF4-FFF2-40B4-BE49-F238E27FC236}">
+                <a16:creationId xmlns:a16="http://schemas.microsoft.com/office/drawing/2014/main" id="{740D4B7F-0590-4700-BBE4-6A3668339B2D}"/>
+              </a:ext>
+            </a:extLst>
+          </p:cNvPr>
+          <p:cNvCxnSpPr>
+            <a:cxnSpLocks/>
+            <a:stCxn id="6" idx="3"/>
+            <a:endCxn id="8" idx="1"/>
+          </p:cNvCxnSpPr>
+          <p:nvPr/>
+        </p:nvCxnSpPr>
+        <p:spPr>
+          <a:xfrm flipV="1">
+            <a:off x="2696133" y="2419350"/>
+            <a:ext cx="1066521" cy="1009650"/>
+          </a:xfrm>
+          <a:prstGeom prst="straightConnector1">
+            <a:avLst/>
+          </a:prstGeom>
+          <a:ln w="57150">
+            <a:solidFill>
+              <a:schemeClr val="accent1">
+                <a:lumMod val="75000"/>
+              </a:schemeClr>
+            </a:solidFill>
+            <a:headEnd type="none" w="med" len="med"/>
+            <a:tailEnd type="triangle" w="med" len="med"/>
+          </a:ln>
+        </p:spPr>
+        <p:style>
+          <a:lnRef idx="1">
+            <a:schemeClr val="accent1"/>
+          </a:lnRef>
+          <a:fillRef idx="0">
+            <a:schemeClr val="accent1"/>
+          </a:fillRef>
+          <a:effectRef idx="0">
+            <a:schemeClr val="accent1"/>
+          </a:effectRef>
+          <a:fontRef idx="minor">
+            <a:schemeClr val="tx1"/>
+          </a:fontRef>
+        </p:style>
+      </p:cxnSp>
+      <p:cxnSp>
+        <p:nvCxnSpPr>
+          <p:cNvPr id="19" name="Straight Arrow Connector 18">
+            <a:extLst>
+              <a:ext uri="{FF2B5EF4-FFF2-40B4-BE49-F238E27FC236}">
+                <a16:creationId xmlns:a16="http://schemas.microsoft.com/office/drawing/2014/main" id="{C938D43C-9722-4A41-B05D-AD5B14886B8B}"/>
+              </a:ext>
+            </a:extLst>
+          </p:cNvPr>
+          <p:cNvCxnSpPr>
+            <a:cxnSpLocks/>
+            <a:stCxn id="11" idx="3"/>
+            <a:endCxn id="12" idx="1"/>
+          </p:cNvCxnSpPr>
+          <p:nvPr/>
+        </p:nvCxnSpPr>
+        <p:spPr>
+          <a:xfrm flipV="1">
+            <a:off x="5644272" y="3429000"/>
+            <a:ext cx="1084026" cy="1009650"/>
+          </a:xfrm>
+          <a:prstGeom prst="straightConnector1">
+            <a:avLst/>
+          </a:prstGeom>
+          <a:ln w="57150">
+            <a:solidFill>
+              <a:schemeClr val="accent1">
+                <a:lumMod val="75000"/>
+              </a:schemeClr>
+            </a:solidFill>
+            <a:headEnd type="none" w="med" len="med"/>
+            <a:tailEnd type="triangle" w="med" len="med"/>
+          </a:ln>
+        </p:spPr>
+        <p:style>
+          <a:lnRef idx="1">
+            <a:schemeClr val="accent1"/>
+          </a:lnRef>
+          <a:fillRef idx="0">
+            <a:schemeClr val="accent1"/>
+          </a:fillRef>
+          <a:effectRef idx="0">
+            <a:schemeClr val="accent1"/>
+          </a:effectRef>
+          <a:fontRef idx="minor">
+            <a:schemeClr val="tx1"/>
+          </a:fontRef>
+        </p:style>
+      </p:cxnSp>
+      <p:cxnSp>
+        <p:nvCxnSpPr>
+          <p:cNvPr id="27" name="Straight Arrow Connector 26">
+            <a:extLst>
+              <a:ext uri="{FF2B5EF4-FFF2-40B4-BE49-F238E27FC236}">
+                <a16:creationId xmlns:a16="http://schemas.microsoft.com/office/drawing/2014/main" id="{D72ECBAB-3C8F-483D-8341-B9D0FBFA5825}"/>
+              </a:ext>
+            </a:extLst>
+          </p:cNvPr>
+          <p:cNvCxnSpPr>
+            <a:cxnSpLocks/>
+            <a:stCxn id="8" idx="3"/>
+            <a:endCxn id="12" idx="1"/>
+          </p:cNvCxnSpPr>
+          <p:nvPr/>
+        </p:nvCxnSpPr>
+        <p:spPr>
+          <a:xfrm>
+            <a:off x="5661777" y="2419350"/>
+            <a:ext cx="1066521" cy="1009650"/>
+          </a:xfrm>
+          <a:prstGeom prst="straightConnector1">
+            <a:avLst/>
+          </a:prstGeom>
+          <a:ln w="57150">
+            <a:solidFill>
+              <a:schemeClr val="accent1">
+                <a:lumMod val="75000"/>
+              </a:schemeClr>
+            </a:solidFill>
+            <a:headEnd type="none" w="med" len="med"/>
+            <a:tailEnd type="triangle" w="med" len="med"/>
+          </a:ln>
+        </p:spPr>
+        <p:style>
+          <a:lnRef idx="1">
+            <a:schemeClr val="accent1"/>
+          </a:lnRef>
+          <a:fillRef idx="0">
+            <a:schemeClr val="accent1"/>
+          </a:fillRef>
+          <a:effectRef idx="0">
+            <a:schemeClr val="accent1"/>
+          </a:effectRef>
+          <a:fontRef idx="minor">
+            <a:schemeClr val="tx1"/>
+          </a:fontRef>
+        </p:style>
+      </p:cxnSp>
+      <p:cxnSp>
+        <p:nvCxnSpPr>
+          <p:cNvPr id="30" name="Straight Arrow Connector 29">
+            <a:extLst>
+              <a:ext uri="{FF2B5EF4-FFF2-40B4-BE49-F238E27FC236}">
+                <a16:creationId xmlns:a16="http://schemas.microsoft.com/office/drawing/2014/main" id="{E13AC045-304F-4E21-8968-3AE4EFB8011E}"/>
+              </a:ext>
+            </a:extLst>
+          </p:cNvPr>
+          <p:cNvCxnSpPr>
+            <a:cxnSpLocks/>
+            <a:stCxn id="12" idx="3"/>
+            <a:endCxn id="13" idx="1"/>
+          </p:cNvCxnSpPr>
+          <p:nvPr/>
+        </p:nvCxnSpPr>
+        <p:spPr>
+          <a:xfrm>
+            <a:off x="8528523" y="3429000"/>
+            <a:ext cx="1066521" cy="0"/>
+          </a:xfrm>
+          <a:prstGeom prst="straightConnector1">
+            <a:avLst/>
+          </a:prstGeom>
+          <a:ln w="57150">
+            <a:solidFill>
+              <a:schemeClr val="accent1">
+                <a:lumMod val="75000"/>
+              </a:schemeClr>
+            </a:solidFill>
+            <a:headEnd type="none" w="med" len="med"/>
+            <a:tailEnd type="triangle" w="med" len="med"/>
+          </a:ln>
+        </p:spPr>
+        <p:style>
+          <a:lnRef idx="1">
+            <a:schemeClr val="accent1"/>
+          </a:lnRef>
+          <a:fillRef idx="0">
+            <a:schemeClr val="accent1"/>
+          </a:fillRef>
+          <a:effectRef idx="0">
+            <a:schemeClr val="accent1"/>
+          </a:effectRef>
+          <a:fontRef idx="minor">
+            <a:schemeClr val="tx1"/>
+          </a:fontRef>
+        </p:style>
+      </p:cxnSp>
+      <p:sp>
+        <p:nvSpPr>
+          <p:cNvPr id="3" name="Rectangle 2">
+            <a:extLst>
+              <a:ext uri="{FF2B5EF4-FFF2-40B4-BE49-F238E27FC236}">
+                <a16:creationId xmlns:a16="http://schemas.microsoft.com/office/drawing/2014/main" id="{A1AEEA38-DEF7-43F8-9F47-E5A6059C74FD}"/>
+              </a:ext>
+            </a:extLst>
+          </p:cNvPr>
+          <p:cNvSpPr/>
+          <p:nvPr/>
+        </p:nvSpPr>
+        <p:spPr>
+          <a:xfrm>
+            <a:off x="2696133" y="1690688"/>
+            <a:ext cx="9086292" cy="3662362"/>
+          </a:xfrm>
+          <a:prstGeom prst="rect">
+            <a:avLst/>
+          </a:prstGeom>
+          <a:solidFill>
+            <a:schemeClr val="bg1">
+              <a:alpha val="74000"/>
+            </a:schemeClr>
+          </a:solidFill>
+          <a:ln>
+            <a:noFill/>
+          </a:ln>
+        </p:spPr>
+        <p:style>
+          <a:lnRef idx="2">
+            <a:schemeClr val="accent1">
+              <a:shade val="50000"/>
+            </a:schemeClr>
+          </a:lnRef>
+          <a:fillRef idx="1">
+            <a:schemeClr val="accent1"/>
+          </a:fillRef>
+          <a:effectRef idx="0">
+            <a:schemeClr val="accent1"/>
+          </a:effectRef>
+          <a:fontRef idx="minor">
+            <a:schemeClr val="lt1"/>
+          </a:fontRef>
+        </p:style>
+        <p:txBody>
+          <a:bodyPr rtlCol="0" anchor="ctr"/>
+          <a:lstStyle/>
+          <a:p>
+            <a:pPr algn="ctr"/>
+            <a:endParaRPr lang="en-US" dirty="0"/>
+          </a:p>
+        </p:txBody>
+      </p:sp>
+      <p:sp>
+        <p:nvSpPr>
+          <p:cNvPr id="11" name="Rectangle: Rounded Corners 10">
+            <a:extLst>
+              <a:ext uri="{FF2B5EF4-FFF2-40B4-BE49-F238E27FC236}">
+                <a16:creationId xmlns:a16="http://schemas.microsoft.com/office/drawing/2014/main" id="{7FCF8F18-24D2-4394-8441-097E6E5CEC50}"/>
+              </a:ext>
+            </a:extLst>
+          </p:cNvPr>
+          <p:cNvSpPr/>
+          <p:nvPr/>
+        </p:nvSpPr>
+        <p:spPr>
+          <a:xfrm>
+            <a:off x="3745149" y="3933825"/>
+            <a:ext cx="1899123" cy="1009650"/>
+          </a:xfrm>
+          <a:prstGeom prst="roundRect">
+            <a:avLst/>
+          </a:prstGeom>
+          <a:solidFill>
+            <a:schemeClr val="accent1">
+              <a:lumMod val="20000"/>
+              <a:lumOff val="80000"/>
+            </a:schemeClr>
+          </a:solidFill>
+          <a:ln w="28575"/>
+        </p:spPr>
+        <p:style>
+          <a:lnRef idx="2">
+            <a:schemeClr val="accent1">
+              <a:shade val="50000"/>
+            </a:schemeClr>
+          </a:lnRef>
+          <a:fillRef idx="1">
+            <a:schemeClr val="accent1"/>
+          </a:fillRef>
+          <a:effectRef idx="0">
+            <a:schemeClr val="accent1"/>
+          </a:effectRef>
+          <a:fontRef idx="minor">
+            <a:schemeClr val="lt1"/>
+          </a:fontRef>
+        </p:style>
+        <p:txBody>
+          <a:bodyPr rtlCol="0" anchor="ctr"/>
+          <a:lstStyle/>
+          <a:p>
+            <a:pPr algn="ctr"/>
+            <a:r>
+              <a:rPr lang="en-GB" sz="2400" dirty="0">
+                <a:solidFill>
+                  <a:schemeClr val="tx1"/>
+                </a:solidFill>
+              </a:rPr>
+              <a:t>Visualisation</a:t>
+            </a:r>
+            <a:endParaRPr lang="en-US" sz="2400" dirty="0">
+              <a:solidFill>
+                <a:schemeClr val="tx1"/>
+              </a:solidFill>
+            </a:endParaRPr>
+          </a:p>
+        </p:txBody>
+      </p:sp>
+      <p:cxnSp>
+        <p:nvCxnSpPr>
+          <p:cNvPr id="16" name="Straight Arrow Connector 15">
+            <a:extLst>
+              <a:ext uri="{FF2B5EF4-FFF2-40B4-BE49-F238E27FC236}">
+                <a16:creationId xmlns:a16="http://schemas.microsoft.com/office/drawing/2014/main" id="{D79B5414-63D2-48BE-9356-DA3A0CCE2364}"/>
+              </a:ext>
+            </a:extLst>
+          </p:cNvPr>
+          <p:cNvCxnSpPr>
+            <a:cxnSpLocks/>
+            <a:stCxn id="6" idx="3"/>
+            <a:endCxn id="11" idx="1"/>
+          </p:cNvCxnSpPr>
+          <p:nvPr/>
+        </p:nvCxnSpPr>
+        <p:spPr>
+          <a:xfrm>
+            <a:off x="2696133" y="3429000"/>
+            <a:ext cx="1049016" cy="1009650"/>
+          </a:xfrm>
+          <a:prstGeom prst="straightConnector1">
+            <a:avLst/>
+          </a:prstGeom>
+          <a:ln w="57150">
+            <a:solidFill>
+              <a:schemeClr val="accent1">
+                <a:lumMod val="75000"/>
+              </a:schemeClr>
+            </a:solidFill>
+            <a:headEnd type="none" w="med" len="med"/>
+            <a:tailEnd type="triangle" w="med" len="med"/>
+          </a:ln>
+        </p:spPr>
+        <p:style>
+          <a:lnRef idx="1">
+            <a:schemeClr val="accent1"/>
+          </a:lnRef>
+          <a:fillRef idx="0">
+            <a:schemeClr val="accent1"/>
+          </a:fillRef>
+          <a:effectRef idx="0">
+            <a:schemeClr val="accent1"/>
+          </a:effectRef>
+          <a:fontRef idx="minor">
+            <a:schemeClr val="tx1"/>
+          </a:fontRef>
+        </p:style>
+      </p:cxnSp>
+      <p:sp>
+        <p:nvSpPr>
+          <p:cNvPr id="17" name="Title 1">
+            <a:extLst>
+              <a:ext uri="{FF2B5EF4-FFF2-40B4-BE49-F238E27FC236}">
+                <a16:creationId xmlns:a16="http://schemas.microsoft.com/office/drawing/2014/main" id="{324C47D4-A0D6-4C84-92B0-AADFD5A169CE}"/>
+              </a:ext>
+            </a:extLst>
+          </p:cNvPr>
+          <p:cNvSpPr>
+            <a:spLocks noGrp="1"/>
+          </p:cNvSpPr>
+          <p:nvPr>
+            <p:ph type="title"/>
+          </p:nvPr>
+        </p:nvSpPr>
+        <p:spPr>
+          <a:xfrm>
+            <a:off x="879669" y="0"/>
+            <a:ext cx="10515600" cy="1325563"/>
+          </a:xfrm>
+        </p:spPr>
+        <p:txBody>
+          <a:bodyPr/>
+          <a:lstStyle/>
+          <a:p>
+            <a:r>
+              <a:rPr lang="en-GB" dirty="0"/>
+              <a:t>Research project – typical workflow.</a:t>
+            </a:r>
+            <a:endParaRPr lang="en-US" dirty="0"/>
+          </a:p>
+        </p:txBody>
+      </p:sp>
+      <p:sp>
+        <p:nvSpPr>
+          <p:cNvPr id="7" name="TextBox 6">
+            <a:extLst>
+              <a:ext uri="{FF2B5EF4-FFF2-40B4-BE49-F238E27FC236}">
+                <a16:creationId xmlns:a16="http://schemas.microsoft.com/office/drawing/2014/main" id="{345104E1-C01C-4807-BB43-3866769728D8}"/>
+              </a:ext>
+            </a:extLst>
+          </p:cNvPr>
+          <p:cNvSpPr txBox="1"/>
+          <p:nvPr/>
+        </p:nvSpPr>
+        <p:spPr>
+          <a:xfrm>
+            <a:off x="281055" y="1429078"/>
+            <a:ext cx="2618537" cy="461665"/>
+          </a:xfrm>
+          <a:prstGeom prst="rect">
+            <a:avLst/>
+          </a:prstGeom>
+          <a:noFill/>
+          <a:ln>
+            <a:solidFill>
+              <a:srgbClr val="C00000"/>
+            </a:solidFill>
+          </a:ln>
+        </p:spPr>
+        <p:txBody>
+          <a:bodyPr wrap="none" rtlCol="0">
+            <a:spAutoFit/>
+          </a:bodyPr>
+          <a:lstStyle/>
+          <a:p>
+            <a:r>
+              <a:rPr lang="en-GB" sz="2400" b="1" dirty="0">
+                <a:solidFill>
+                  <a:srgbClr val="C00000"/>
+                </a:solidFill>
+              </a:rPr>
+              <a:t>Create an R Project</a:t>
+            </a:r>
+            <a:endParaRPr lang="en-US" sz="2400" b="1" dirty="0">
+              <a:solidFill>
+                <a:srgbClr val="C00000"/>
+              </a:solidFill>
+            </a:endParaRPr>
+          </a:p>
+        </p:txBody>
+      </p:sp>
+      <p:sp>
+        <p:nvSpPr>
+          <p:cNvPr id="18" name="TextBox 17">
+            <a:extLst>
+              <a:ext uri="{FF2B5EF4-FFF2-40B4-BE49-F238E27FC236}">
+                <a16:creationId xmlns:a16="http://schemas.microsoft.com/office/drawing/2014/main" id="{1DEF8572-0FF7-4049-AD67-6D3053342780}"/>
+              </a:ext>
+            </a:extLst>
+          </p:cNvPr>
+          <p:cNvSpPr txBox="1"/>
+          <p:nvPr/>
+        </p:nvSpPr>
+        <p:spPr>
+          <a:xfrm>
+            <a:off x="457878" y="4334381"/>
+            <a:ext cx="2676285" cy="1015663"/>
+          </a:xfrm>
+          <a:prstGeom prst="rect">
+            <a:avLst/>
+          </a:prstGeom>
+          <a:noFill/>
+          <a:ln>
+            <a:solidFill>
+              <a:srgbClr val="C00000"/>
+            </a:solidFill>
+          </a:ln>
+        </p:spPr>
+        <p:txBody>
+          <a:bodyPr wrap="square" rtlCol="0">
+            <a:spAutoFit/>
+          </a:bodyPr>
+          <a:lstStyle/>
+          <a:p>
+            <a:pPr marL="457200" indent="-457200">
+              <a:buFont typeface="Arial" panose="020B0604020202020204" pitchFamily="34" charset="0"/>
+              <a:buChar char="•"/>
+            </a:pPr>
+            <a:r>
+              <a:rPr lang="en-GB" sz="2000" b="1" dirty="0">
+                <a:solidFill>
+                  <a:srgbClr val="C00000"/>
+                </a:solidFill>
+              </a:rPr>
+              <a:t>Loading in data</a:t>
+            </a:r>
+          </a:p>
+          <a:p>
+            <a:pPr marL="457200" indent="-457200">
+              <a:buFont typeface="Arial" panose="020B0604020202020204" pitchFamily="34" charset="0"/>
+              <a:buChar char="•"/>
+            </a:pPr>
+            <a:r>
+              <a:rPr lang="en-GB" sz="2000" b="1" dirty="0">
+                <a:solidFill>
+                  <a:srgbClr val="C00000"/>
+                </a:solidFill>
+              </a:rPr>
+              <a:t>Data management with </a:t>
+            </a:r>
+            <a:r>
+              <a:rPr lang="en-GB" sz="2000" b="1" dirty="0" err="1">
+                <a:solidFill>
+                  <a:srgbClr val="C00000"/>
+                </a:solidFill>
+                <a:latin typeface="Consolas" panose="020B0609020204030204" pitchFamily="49" charset="0"/>
+              </a:rPr>
+              <a:t>dplyr</a:t>
+            </a:r>
+            <a:endParaRPr lang="en-US" sz="2000" b="1" dirty="0">
+              <a:solidFill>
+                <a:srgbClr val="C00000"/>
+              </a:solidFill>
+              <a:latin typeface="Consolas" panose="020B0609020204030204" pitchFamily="49" charset="0"/>
+            </a:endParaRPr>
+          </a:p>
+        </p:txBody>
+      </p:sp>
+      <p:sp>
+        <p:nvSpPr>
+          <p:cNvPr id="20" name="TextBox 19">
+            <a:extLst>
+              <a:ext uri="{FF2B5EF4-FFF2-40B4-BE49-F238E27FC236}">
+                <a16:creationId xmlns:a16="http://schemas.microsoft.com/office/drawing/2014/main" id="{CA00E413-1594-4913-889A-C475309533C5}"/>
+              </a:ext>
+            </a:extLst>
+          </p:cNvPr>
+          <p:cNvSpPr txBox="1"/>
+          <p:nvPr/>
+        </p:nvSpPr>
+        <p:spPr>
+          <a:xfrm>
+            <a:off x="3512045" y="5331419"/>
+            <a:ext cx="2676285" cy="707886"/>
+          </a:xfrm>
+          <a:prstGeom prst="rect">
+            <a:avLst/>
+          </a:prstGeom>
+          <a:noFill/>
+          <a:ln>
+            <a:solidFill>
+              <a:srgbClr val="C00000"/>
+            </a:solidFill>
+          </a:ln>
+        </p:spPr>
+        <p:txBody>
+          <a:bodyPr wrap="square" rtlCol="0">
+            <a:spAutoFit/>
+          </a:bodyPr>
+          <a:lstStyle/>
+          <a:p>
+            <a:pPr marL="457200" indent="-457200">
+              <a:buFont typeface="Arial" panose="020B0604020202020204" pitchFamily="34" charset="0"/>
+              <a:buChar char="•"/>
+            </a:pPr>
+            <a:r>
+              <a:rPr lang="en-GB" sz="2000" b="1" dirty="0">
+                <a:solidFill>
+                  <a:srgbClr val="C00000"/>
+                </a:solidFill>
+              </a:rPr>
+              <a:t>Data visualisation with </a:t>
+            </a:r>
+            <a:r>
+              <a:rPr lang="en-GB" sz="2000" b="1" dirty="0">
+                <a:solidFill>
+                  <a:srgbClr val="C00000"/>
+                </a:solidFill>
+                <a:latin typeface="Consolas" panose="020B0609020204030204" pitchFamily="49" charset="0"/>
+              </a:rPr>
+              <a:t>ggplot2</a:t>
+            </a:r>
+            <a:endParaRPr lang="en-US" sz="2000" b="1" dirty="0">
+              <a:solidFill>
+                <a:srgbClr val="C00000"/>
+              </a:solidFill>
+              <a:latin typeface="Consolas" panose="020B0609020204030204" pitchFamily="49" charset="0"/>
+            </a:endParaRPr>
+          </a:p>
+        </p:txBody>
+      </p:sp>
+    </p:spTree>
+    <p:extLst>
+      <p:ext uri="{BB962C8B-B14F-4D97-AF65-F5344CB8AC3E}">
+        <p14:creationId xmlns:p14="http://schemas.microsoft.com/office/powerpoint/2010/main" val="3328292379"/>
+      </p:ext>
+    </p:extLst>
+  </p:cSld>
+  <p:clrMapOvr>
+    <a:masterClrMapping/>
+  </p:clrMapOvr>
+  <p:timing>
+    <p:tnLst>
+      <p:par>
+        <p:cTn id="1" dur="indefinite" restart="never" nodeType="tmRoot">
+          <p:childTnLst>
+            <p:seq concurrent="1" nextAc="seek">
+              <p:cTn id="2" dur="indefinite" nodeType="mainSeq">
+                <p:childTnLst>
+                  <p:par>
+                    <p:cTn id="3" fill="hold">
+                      <p:stCondLst>
+                        <p:cond delay="indefinite"/>
+                      </p:stCondLst>
+                      <p:childTnLst>
+                        <p:par>
+                          <p:cTn id="4" fill="hold">
+                            <p:stCondLst>
+                              <p:cond delay="0"/>
+                            </p:stCondLst>
+                            <p:childTnLst>
+                              <p:par>
+                                <p:cTn id="5" presetID="1" presetClass="entr" presetSubtype="0" fill="hold" grpId="0" nodeType="clickEffect">
+                                  <p:stCondLst>
+                                    <p:cond delay="0"/>
+                                  </p:stCondLst>
+                                  <p:childTnLst>
+                                    <p:set>
+                                      <p:cBhvr>
+                                        <p:cTn id="6" dur="1" fill="hold">
+                                          <p:stCondLst>
+                                            <p:cond delay="0"/>
+                                          </p:stCondLst>
+                                        </p:cTn>
+                                        <p:tgtEl>
+                                          <p:spTgt spid="7"/>
+                                        </p:tgtEl>
+                                        <p:attrNameLst>
+                                          <p:attrName>style.visibility</p:attrName>
+                                        </p:attrNameLst>
+                                      </p:cBhvr>
+                                      <p:to>
+                                        <p:strVal val="visible"/>
+                                      </p:to>
+                                    </p:set>
+                                  </p:childTnLst>
+                                </p:cTn>
+                              </p:par>
+                            </p:childTnLst>
+                          </p:cTn>
+                        </p:par>
+                      </p:childTnLst>
+                    </p:cTn>
+                  </p:par>
+                  <p:par>
+                    <p:cTn id="7" fill="hold">
+                      <p:stCondLst>
+                        <p:cond delay="indefinite"/>
+                      </p:stCondLst>
+                      <p:childTnLst>
+                        <p:par>
+                          <p:cTn id="8" fill="hold">
+                            <p:stCondLst>
+                              <p:cond delay="0"/>
+                            </p:stCondLst>
+                            <p:childTnLst>
+                              <p:par>
+                                <p:cTn id="9" presetID="1" presetClass="entr" presetSubtype="0" fill="hold" grpId="0" nodeType="clickEffect">
+                                  <p:stCondLst>
+                                    <p:cond delay="0"/>
+                                  </p:stCondLst>
+                                  <p:childTnLst>
+                                    <p:set>
+                                      <p:cBhvr>
+                                        <p:cTn id="10" dur="1" fill="hold">
+                                          <p:stCondLst>
+                                            <p:cond delay="0"/>
+                                          </p:stCondLst>
+                                        </p:cTn>
+                                        <p:tgtEl>
+                                          <p:spTgt spid="18"/>
+                                        </p:tgtEl>
+                                        <p:attrNameLst>
+                                          <p:attrName>style.visibility</p:attrName>
+                                        </p:attrNameLst>
+                                      </p:cBhvr>
+                                      <p:to>
+                                        <p:strVal val="visible"/>
+                                      </p:to>
+                                    </p:set>
+                                  </p:childTnLst>
+                                </p:cTn>
+                              </p:par>
+                            </p:childTnLst>
+                          </p:cTn>
+                        </p:par>
+                      </p:childTnLst>
+                    </p:cTn>
+                  </p:par>
+                  <p:par>
+                    <p:cTn id="11" fill="hold">
+                      <p:stCondLst>
+                        <p:cond delay="indefinite"/>
+                      </p:stCondLst>
+                      <p:childTnLst>
+                        <p:par>
+                          <p:cTn id="12" fill="hold">
+                            <p:stCondLst>
+                              <p:cond delay="0"/>
+                            </p:stCondLst>
+                            <p:childTnLst>
+                              <p:par>
+                                <p:cTn id="13" presetID="1" presetClass="entr" presetSubtype="0" fill="hold" grpId="0" nodeType="clickEffect">
+                                  <p:stCondLst>
+                                    <p:cond delay="0"/>
+                                  </p:stCondLst>
+                                  <p:childTnLst>
+                                    <p:set>
+                                      <p:cBhvr>
+                                        <p:cTn id="14" dur="1" fill="hold">
+                                          <p:stCondLst>
+                                            <p:cond delay="0"/>
+                                          </p:stCondLst>
+                                        </p:cTn>
+                                        <p:tgtEl>
+                                          <p:spTgt spid="20"/>
+                                        </p:tgtEl>
+                                        <p:attrNameLst>
+                                          <p:attrName>style.visibility</p:attrName>
+                                        </p:attrNameLst>
+                                      </p:cBhvr>
+                                      <p:to>
+                                        <p:strVal val="visible"/>
+                                      </p:to>
+                                    </p:set>
+                                  </p:childTnLst>
+                                </p:cTn>
+                              </p:par>
+                            </p:childTnLst>
+                          </p:cTn>
+                        </p:par>
+                      </p:childTnLst>
+                    </p:cTn>
+                  </p:par>
+                  <p:par>
+                    <p:cTn id="15" fill="hold">
+                      <p:stCondLst>
+                        <p:cond delay="indefinite"/>
+                      </p:stCondLst>
+                      <p:childTnLst>
+                        <p:par>
+                          <p:cTn id="16" fill="hold">
+                            <p:stCondLst>
+                              <p:cond delay="0"/>
+                            </p:stCondLst>
+                            <p:childTnLst>
+                              <p:par>
+                                <p:cTn id="17" presetID="10" presetClass="exit" presetSubtype="0" fill="hold" grpId="0" nodeType="clickEffect">
+                                  <p:stCondLst>
+                                    <p:cond delay="0"/>
+                                  </p:stCondLst>
+                                  <p:childTnLst>
+                                    <p:animEffect transition="out" filter="fade">
+                                      <p:cBhvr>
+                                        <p:cTn id="18" dur="250"/>
+                                        <p:tgtEl>
+                                          <p:spTgt spid="3"/>
+                                        </p:tgtEl>
+                                      </p:cBhvr>
+                                    </p:animEffect>
+                                    <p:set>
+                                      <p:cBhvr>
+                                        <p:cTn id="19" dur="1" fill="hold">
+                                          <p:stCondLst>
+                                            <p:cond delay="249"/>
+                                          </p:stCondLst>
+                                        </p:cTn>
+                                        <p:tgtEl>
+                                          <p:spTgt spid="3"/>
+                                        </p:tgtEl>
+                                        <p:attrNameLst>
+                                          <p:attrName>style.visibility</p:attrName>
+                                        </p:attrNameLst>
+                                      </p:cBhvr>
+                                      <p:to>
+                                        <p:strVal val="hidden"/>
+                                      </p:to>
+                                    </p:set>
+                                  </p:childTnLst>
+                                </p:cTn>
+                              </p:par>
+                            </p:childTnLst>
+                          </p:cTn>
+                        </p:par>
+                      </p:childTnLst>
+                    </p:cTn>
+                  </p:par>
+                </p:childTnLst>
+              </p:cTn>
+              <p:prevCondLst>
+                <p:cond evt="onPrev" delay="0">
+                  <p:tgtEl>
+                    <p:sldTgt/>
+                  </p:tgtEl>
+                </p:cond>
+              </p:prevCondLst>
+              <p:nextCondLst>
+                <p:cond evt="onNext" delay="0">
+                  <p:tgtEl>
+                    <p:sldTgt/>
+                  </p:tgtEl>
+                </p:cond>
+              </p:nextCondLst>
+            </p:seq>
+          </p:childTnLst>
+        </p:cTn>
+      </p:par>
+    </p:tnLst>
+    <p:bldLst>
+      <p:bldP spid="3" grpId="0" animBg="1"/>
+      <p:bldP spid="7" grpId="0" animBg="1"/>
+      <p:bldP spid="18" grpId="0" animBg="1"/>
+      <p:bldP spid="20" grpId="0" animBg="1"/>
+    </p:bldLst>
+  </p:timing>
+</p:sld>
+</file>
+
+<file path=ppt/slides/slide4.xml><?xml version="1.0" encoding="utf-8"?>
+<p:sld xmlns:a="http://schemas.openxmlformats.org/drawingml/2006/main" xmlns:r="http://schemas.openxmlformats.org/officeDocument/2006/relationships" xmlns:p="http://schemas.openxmlformats.org/presentationml/2006/main">
+  <p:cSld>
+    <p:spTree>
+      <p:nvGrpSpPr>
+        <p:cNvPr id="1" name=""/>
+        <p:cNvGrpSpPr/>
+        <p:nvPr/>
+      </p:nvGrpSpPr>
+      <p:grpSpPr>
+        <a:xfrm>
+          <a:off x="0" y="0"/>
+          <a:ext cx="0" cy="0"/>
+          <a:chOff x="0" y="0"/>
+          <a:chExt cx="0" cy="0"/>
+        </a:xfrm>
+      </p:grpSpPr>
+      <p:sp>
+        <p:nvSpPr>
+          <p:cNvPr id="2" name="Title 1">
+            <a:extLst>
+              <a:ext uri="{FF2B5EF4-FFF2-40B4-BE49-F238E27FC236}">
+                <a16:creationId xmlns:a16="http://schemas.microsoft.com/office/drawing/2014/main" id="{FDF860D4-F5B5-41D8-B131-7367AE5C695F}"/>
+              </a:ext>
+            </a:extLst>
+          </p:cNvPr>
+          <p:cNvSpPr>
+            <a:spLocks noGrp="1"/>
+          </p:cNvSpPr>
+          <p:nvPr>
+            <p:ph type="title"/>
+          </p:nvPr>
+        </p:nvSpPr>
+        <p:spPr/>
+        <p:txBody>
+          <a:bodyPr/>
+          <a:lstStyle/>
+          <a:p>
+            <a:r>
+              <a:rPr lang="en-GB" dirty="0"/>
+              <a:t>Today’s session:</a:t>
+            </a:r>
+            <a:endParaRPr lang="en-US" dirty="0"/>
+          </a:p>
+        </p:txBody>
+      </p:sp>
+      <p:sp>
+        <p:nvSpPr>
+          <p:cNvPr id="3" name="Content Placeholder 2">
+            <a:extLst>
+              <a:ext uri="{FF2B5EF4-FFF2-40B4-BE49-F238E27FC236}">
+                <a16:creationId xmlns:a16="http://schemas.microsoft.com/office/drawing/2014/main" id="{8D5E960B-82BE-4065-BB48-580DFFC7EEF9}"/>
+              </a:ext>
+            </a:extLst>
+          </p:cNvPr>
+          <p:cNvSpPr>
+            <a:spLocks noGrp="1"/>
+          </p:cNvSpPr>
+          <p:nvPr>
+            <p:ph idx="1"/>
+          </p:nvPr>
+        </p:nvSpPr>
+        <p:spPr>
+          <a:xfrm>
+            <a:off x="721918" y="1750769"/>
+            <a:ext cx="10515600" cy="4351338"/>
+          </a:xfrm>
+        </p:spPr>
+        <p:txBody>
+          <a:bodyPr>
+            <a:normAutofit/>
+          </a:bodyPr>
+          <a:lstStyle/>
+          <a:p>
+            <a:r>
+              <a:rPr lang="en-US" dirty="0"/>
+              <a:t>Carry out basic statistics and </a:t>
+            </a:r>
+            <a:r>
+              <a:rPr lang="en-US" dirty="0" err="1"/>
+              <a:t>visualisations</a:t>
+            </a:r>
+            <a:r>
+              <a:rPr lang="en-US" dirty="0"/>
+              <a:t>, including:</a:t>
+            </a:r>
+          </a:p>
+          <a:p>
+            <a:pPr lvl="1"/>
+            <a:endParaRPr lang="en-US" dirty="0"/>
+          </a:p>
+          <a:p>
+            <a:pPr lvl="1"/>
+            <a:r>
+              <a:rPr lang="en-US" dirty="0"/>
+              <a:t>Chi-squared test with </a:t>
+            </a:r>
+            <a:r>
+              <a:rPr lang="en-US" dirty="0" err="1">
+                <a:solidFill>
+                  <a:srgbClr val="FF0000"/>
+                </a:solidFill>
+                <a:latin typeface="Consolas" panose="020B0609020204030204" pitchFamily="49" charset="0"/>
+              </a:rPr>
+              <a:t>chisq.test</a:t>
+            </a:r>
+            <a:r>
+              <a:rPr lang="en-US" dirty="0">
+                <a:solidFill>
+                  <a:srgbClr val="FF0000"/>
+                </a:solidFill>
+                <a:latin typeface="Consolas" panose="020B0609020204030204" pitchFamily="49" charset="0"/>
+              </a:rPr>
+              <a:t>()</a:t>
+            </a:r>
+          </a:p>
+          <a:p>
+            <a:pPr lvl="1"/>
+            <a:endParaRPr lang="en-US" dirty="0"/>
+          </a:p>
+          <a:p>
+            <a:pPr lvl="1"/>
+            <a:r>
+              <a:rPr lang="en-US" dirty="0"/>
+              <a:t>2-sample t-test with </a:t>
+            </a:r>
+            <a:r>
+              <a:rPr lang="en-US" dirty="0" err="1">
+                <a:solidFill>
+                  <a:srgbClr val="FF0000"/>
+                </a:solidFill>
+                <a:latin typeface="Consolas" panose="020B0609020204030204" pitchFamily="49" charset="0"/>
+              </a:rPr>
+              <a:t>t.test</a:t>
+            </a:r>
+            <a:r>
+              <a:rPr lang="en-US" dirty="0">
+                <a:solidFill>
+                  <a:srgbClr val="FF0000"/>
+                </a:solidFill>
+                <a:latin typeface="Consolas" panose="020B0609020204030204" pitchFamily="49" charset="0"/>
+              </a:rPr>
+              <a:t>()</a:t>
+            </a:r>
+          </a:p>
+          <a:p>
+            <a:pPr lvl="1"/>
+            <a:endParaRPr lang="en-US" dirty="0"/>
+          </a:p>
+          <a:p>
+            <a:pPr lvl="1"/>
+            <a:r>
+              <a:rPr lang="en-US" dirty="0"/>
+              <a:t>Linear regression with </a:t>
+            </a:r>
+            <a:r>
+              <a:rPr lang="en-US" dirty="0" err="1">
+                <a:solidFill>
+                  <a:srgbClr val="FF0000"/>
+                </a:solidFill>
+                <a:latin typeface="Consolas" panose="020B0609020204030204" pitchFamily="49" charset="0"/>
+              </a:rPr>
+              <a:t>lm</a:t>
+            </a:r>
+            <a:r>
+              <a:rPr lang="en-US" dirty="0">
+                <a:solidFill>
+                  <a:srgbClr val="FF0000"/>
+                </a:solidFill>
+                <a:latin typeface="Consolas" panose="020B0609020204030204" pitchFamily="49" charset="0"/>
+              </a:rPr>
+              <a:t>()</a:t>
+            </a:r>
+          </a:p>
+          <a:p>
+            <a:pPr lvl="1"/>
+            <a:endParaRPr lang="en-GB" dirty="0">
+              <a:solidFill>
+                <a:srgbClr val="FF0000"/>
+              </a:solidFill>
+              <a:latin typeface="Consolas" panose="020B0609020204030204" pitchFamily="49" charset="0"/>
+            </a:endParaRPr>
+          </a:p>
+          <a:p>
+            <a:r>
+              <a:rPr lang="en-US" dirty="0"/>
+              <a:t>Write, embed and render code and results into an HTML document.</a:t>
+            </a:r>
+          </a:p>
+          <a:p>
+            <a:pPr lvl="1"/>
+            <a:endParaRPr lang="en-US" dirty="0">
+              <a:solidFill>
+                <a:srgbClr val="FF0000"/>
+              </a:solidFill>
+              <a:latin typeface="Consolas" panose="020B0609020204030204" pitchFamily="49" charset="0"/>
+            </a:endParaRPr>
+          </a:p>
+        </p:txBody>
+      </p:sp>
+    </p:spTree>
+    <p:extLst>
+      <p:ext uri="{BB962C8B-B14F-4D97-AF65-F5344CB8AC3E}">
+        <p14:creationId xmlns:p14="http://schemas.microsoft.com/office/powerpoint/2010/main" val="3315054386"/>
+      </p:ext>
+    </p:extLst>
+  </p:cSld>
+  <p:clrMapOvr>
+    <a:masterClrMapping/>
+  </p:clrMapOvr>
+</p:sld>
+</file>
+
+<file path=ppt/slides/slide5.xml><?xml version="1.0" encoding="utf-8"?>
+<p:sld xmlns:a="http://schemas.openxmlformats.org/drawingml/2006/main" xmlns:r="http://schemas.openxmlformats.org/officeDocument/2006/relationships" xmlns:p="http://schemas.openxmlformats.org/presentationml/2006/main">
+  <p:cSld>
+    <p:spTree>
+      <p:nvGrpSpPr>
+        <p:cNvPr id="1" name=""/>
+        <p:cNvGrpSpPr/>
+        <p:nvPr/>
+      </p:nvGrpSpPr>
+      <p:grpSpPr>
+        <a:xfrm>
+          <a:off x="0" y="0"/>
+          <a:ext cx="0" cy="0"/>
+          <a:chOff x="0" y="0"/>
+          <a:chExt cx="0" cy="0"/>
+        </a:xfrm>
+      </p:grpSpPr>
+      <p:sp>
+        <p:nvSpPr>
+          <p:cNvPr id="15" name="Title 1">
+            <a:extLst>
+              <a:ext uri="{FF2B5EF4-FFF2-40B4-BE49-F238E27FC236}">
+                <a16:creationId xmlns:a16="http://schemas.microsoft.com/office/drawing/2014/main" id="{2224C1A7-59D9-49D3-938B-46B174E23D9A}"/>
+              </a:ext>
+            </a:extLst>
+          </p:cNvPr>
+          <p:cNvSpPr>
+            <a:spLocks noGrp="1"/>
+          </p:cNvSpPr>
+          <p:nvPr>
+            <p:ph type="title"/>
+          </p:nvPr>
+        </p:nvSpPr>
+        <p:spPr>
+          <a:xfrm>
+            <a:off x="838200" y="365125"/>
+            <a:ext cx="10515600" cy="1325563"/>
+          </a:xfrm>
+        </p:spPr>
+        <p:txBody>
+          <a:bodyPr/>
+          <a:lstStyle/>
+          <a:p>
+            <a:r>
+              <a:rPr lang="en-GB" dirty="0"/>
+              <a:t>Report writing</a:t>
+            </a:r>
+            <a:endParaRPr lang="en-US" dirty="0"/>
+          </a:p>
+        </p:txBody>
+      </p:sp>
+      <p:pic>
+        <p:nvPicPr>
+          <p:cNvPr id="16" name="Picture 15">
+            <a:extLst>
+              <a:ext uri="{FF2B5EF4-FFF2-40B4-BE49-F238E27FC236}">
+                <a16:creationId xmlns:a16="http://schemas.microsoft.com/office/drawing/2014/main" id="{68246553-9C67-497B-B0A8-22E9927DA231}"/>
+              </a:ext>
+            </a:extLst>
+          </p:cNvPr>
+          <p:cNvPicPr>
+            <a:picLocks noChangeAspect="1"/>
+          </p:cNvPicPr>
+          <p:nvPr/>
+        </p:nvPicPr>
+        <p:blipFill rotWithShape="1">
+          <a:blip r:embed="rId2"/>
+          <a:srcRect b="26134"/>
+          <a:stretch/>
+        </p:blipFill>
+        <p:spPr>
+          <a:xfrm>
+            <a:off x="674727" y="1932495"/>
+            <a:ext cx="5137517" cy="3789575"/>
+          </a:xfrm>
+          <a:prstGeom prst="rect">
+            <a:avLst/>
+          </a:prstGeom>
+          <a:ln>
+            <a:solidFill>
+              <a:schemeClr val="tx1"/>
+            </a:solidFill>
+          </a:ln>
+        </p:spPr>
+      </p:pic>
+      <p:sp>
+        <p:nvSpPr>
+          <p:cNvPr id="17" name="TextBox 16">
+            <a:extLst>
+              <a:ext uri="{FF2B5EF4-FFF2-40B4-BE49-F238E27FC236}">
+                <a16:creationId xmlns:a16="http://schemas.microsoft.com/office/drawing/2014/main" id="{9B145CEA-BA89-46DA-A569-C180F5CEFC80}"/>
+              </a:ext>
+            </a:extLst>
+          </p:cNvPr>
+          <p:cNvSpPr txBox="1"/>
+          <p:nvPr/>
+        </p:nvSpPr>
+        <p:spPr>
+          <a:xfrm>
+            <a:off x="1573951" y="5850755"/>
+            <a:ext cx="4072705" cy="523220"/>
+          </a:xfrm>
+          <a:prstGeom prst="rect">
+            <a:avLst/>
+          </a:prstGeom>
+          <a:noFill/>
+        </p:spPr>
+        <p:txBody>
+          <a:bodyPr wrap="square" rtlCol="0">
+            <a:spAutoFit/>
+          </a:bodyPr>
+          <a:lstStyle/>
+          <a:p>
+            <a:r>
+              <a:rPr lang="en-GB" sz="2800" dirty="0" err="1"/>
+              <a:t>LaTeX</a:t>
+            </a:r>
+            <a:r>
+              <a:rPr lang="en-GB" sz="2800" dirty="0"/>
+              <a:t> and R </a:t>
+            </a:r>
+            <a:r>
+              <a:rPr lang="en-GB" sz="2800" dirty="0" err="1"/>
+              <a:t>Sweave</a:t>
+            </a:r>
+            <a:endParaRPr lang="en-US" sz="2800" dirty="0"/>
+          </a:p>
+        </p:txBody>
+      </p:sp>
+      <p:pic>
+        <p:nvPicPr>
+          <p:cNvPr id="18" name="Picture 17">
+            <a:extLst>
+              <a:ext uri="{FF2B5EF4-FFF2-40B4-BE49-F238E27FC236}">
+                <a16:creationId xmlns:a16="http://schemas.microsoft.com/office/drawing/2014/main" id="{00B30231-A8F6-481F-9C33-A54E8FCF5298}"/>
+              </a:ext>
+            </a:extLst>
+          </p:cNvPr>
+          <p:cNvPicPr>
+            <a:picLocks noChangeAspect="1"/>
+          </p:cNvPicPr>
+          <p:nvPr/>
+        </p:nvPicPr>
+        <p:blipFill rotWithShape="1">
+          <a:blip r:embed="rId3"/>
+          <a:srcRect b="10567"/>
+          <a:stretch/>
+        </p:blipFill>
+        <p:spPr>
+          <a:xfrm>
+            <a:off x="6595640" y="1932495"/>
+            <a:ext cx="5089649" cy="3789575"/>
+          </a:xfrm>
+          <a:prstGeom prst="rect">
+            <a:avLst/>
+          </a:prstGeom>
+          <a:ln>
+            <a:solidFill>
+              <a:schemeClr val="tx1"/>
+            </a:solidFill>
+          </a:ln>
+        </p:spPr>
+      </p:pic>
+      <p:sp>
+        <p:nvSpPr>
+          <p:cNvPr id="19" name="TextBox 18">
+            <a:extLst>
+              <a:ext uri="{FF2B5EF4-FFF2-40B4-BE49-F238E27FC236}">
+                <a16:creationId xmlns:a16="http://schemas.microsoft.com/office/drawing/2014/main" id="{FF1AFC15-7EDE-4C6F-B9B8-53D559382FBE}"/>
+              </a:ext>
+            </a:extLst>
+          </p:cNvPr>
+          <p:cNvSpPr txBox="1"/>
+          <p:nvPr/>
+        </p:nvSpPr>
+        <p:spPr>
+          <a:xfrm>
+            <a:off x="7965261" y="5898741"/>
+            <a:ext cx="2568839" cy="523220"/>
+          </a:xfrm>
+          <a:prstGeom prst="rect">
+            <a:avLst/>
+          </a:prstGeom>
+          <a:noFill/>
+        </p:spPr>
+        <p:txBody>
+          <a:bodyPr wrap="square" rtlCol="0">
+            <a:spAutoFit/>
+          </a:bodyPr>
+          <a:lstStyle/>
+          <a:p>
+            <a:r>
+              <a:rPr lang="en-GB" sz="2800" dirty="0" err="1">
+                <a:solidFill>
+                  <a:srgbClr val="FF0000"/>
+                </a:solidFill>
+                <a:latin typeface="Consolas" panose="020B0609020204030204" pitchFamily="49" charset="0"/>
+              </a:rPr>
+              <a:t>knitr</a:t>
+            </a:r>
+            <a:r>
+              <a:rPr lang="en-GB" sz="2800" dirty="0"/>
+              <a:t> to HTML</a:t>
+            </a:r>
+            <a:endParaRPr lang="en-US" sz="2800" dirty="0"/>
+          </a:p>
+        </p:txBody>
+      </p:sp>
+      <p:sp>
+        <p:nvSpPr>
+          <p:cNvPr id="2" name="Rectangle 1">
+            <a:extLst>
+              <a:ext uri="{FF2B5EF4-FFF2-40B4-BE49-F238E27FC236}">
+                <a16:creationId xmlns:a16="http://schemas.microsoft.com/office/drawing/2014/main" id="{510B7804-09B5-40B9-BEBF-373E3BF39C3D}"/>
+              </a:ext>
+            </a:extLst>
+          </p:cNvPr>
+          <p:cNvSpPr/>
+          <p:nvPr/>
+        </p:nvSpPr>
+        <p:spPr>
+          <a:xfrm>
+            <a:off x="6326800" y="1437669"/>
+            <a:ext cx="5607968" cy="5243265"/>
+          </a:xfrm>
+          <a:prstGeom prst="rect">
+            <a:avLst/>
+          </a:prstGeom>
+          <a:noFill/>
+          <a:ln w="57150">
+            <a:solidFill>
+              <a:srgbClr val="FF0000"/>
+            </a:solidFill>
+          </a:ln>
+        </p:spPr>
+        <p:style>
+          <a:lnRef idx="2">
+            <a:schemeClr val="accent1">
+              <a:shade val="50000"/>
+            </a:schemeClr>
+          </a:lnRef>
+          <a:fillRef idx="1">
+            <a:schemeClr val="accent1"/>
+          </a:fillRef>
+          <a:effectRef idx="0">
+            <a:schemeClr val="accent1"/>
+          </a:effectRef>
+          <a:fontRef idx="minor">
+            <a:schemeClr val="lt1"/>
+          </a:fontRef>
+        </p:style>
+        <p:txBody>
+          <a:bodyPr rtlCol="0" anchor="ctr"/>
+          <a:lstStyle/>
+          <a:p>
+            <a:pPr algn="ctr"/>
+            <a:endParaRPr lang="en-US"/>
+          </a:p>
+        </p:txBody>
+      </p:sp>
+    </p:spTree>
+    <p:extLst>
+      <p:ext uri="{BB962C8B-B14F-4D97-AF65-F5344CB8AC3E}">
+        <p14:creationId xmlns:p14="http://schemas.microsoft.com/office/powerpoint/2010/main" val="3649852905"/>
+      </p:ext>
+    </p:extLst>
+  </p:cSld>
+  <p:clrMapOvr>
+    <a:masterClrMapping/>
+  </p:clrMapOvr>
+</p:sld>
+</file>
+
+<file path=ppt/slides/slide6.xml><?xml version="1.0" encoding="utf-8"?>
+<p:sld xmlns:a="http://schemas.openxmlformats.org/drawingml/2006/main" xmlns:r="http://schemas.openxmlformats.org/officeDocument/2006/relationships" xmlns:p="http://schemas.openxmlformats.org/presentationml/2006/main">
+  <p:cSld>
+    <p:spTree>
+      <p:nvGrpSpPr>
+        <p:cNvPr id="1" name=""/>
+        <p:cNvGrpSpPr/>
+        <p:nvPr/>
+      </p:nvGrpSpPr>
+      <p:grpSpPr>
+        <a:xfrm>
+          <a:off x="0" y="0"/>
+          <a:ext cx="0" cy="0"/>
+          <a:chOff x="0" y="0"/>
+          <a:chExt cx="0" cy="0"/>
+        </a:xfrm>
+      </p:grpSpPr>
+      <p:pic>
+        <p:nvPicPr>
+          <p:cNvPr id="4" name="Picture 3">
+            <a:extLst>
+              <a:ext uri="{FF2B5EF4-FFF2-40B4-BE49-F238E27FC236}">
+                <a16:creationId xmlns:a16="http://schemas.microsoft.com/office/drawing/2014/main" id="{B1DB2824-346C-4C48-99FF-E476DF27ADE9}"/>
+              </a:ext>
+            </a:extLst>
+          </p:cNvPr>
+          <p:cNvPicPr>
+            <a:picLocks noChangeAspect="1"/>
+          </p:cNvPicPr>
+          <p:nvPr/>
+        </p:nvPicPr>
+        <p:blipFill rotWithShape="1">
+          <a:blip r:embed="rId2"/>
+          <a:srcRect b="53040"/>
+          <a:stretch/>
+        </p:blipFill>
+        <p:spPr>
+          <a:xfrm>
+            <a:off x="1573929" y="126853"/>
+            <a:ext cx="9753004" cy="2637489"/>
+          </a:xfrm>
+          <a:prstGeom prst="rect">
+            <a:avLst/>
+          </a:prstGeom>
+        </p:spPr>
+      </p:pic>
+      <p:pic>
+        <p:nvPicPr>
+          <p:cNvPr id="5" name="Picture 4">
+            <a:extLst>
+              <a:ext uri="{FF2B5EF4-FFF2-40B4-BE49-F238E27FC236}">
+                <a16:creationId xmlns:a16="http://schemas.microsoft.com/office/drawing/2014/main" id="{84768084-9155-4EDA-8C16-DF48778BAB8B}"/>
+              </a:ext>
+            </a:extLst>
+          </p:cNvPr>
+          <p:cNvPicPr>
+            <a:picLocks noChangeAspect="1"/>
+          </p:cNvPicPr>
+          <p:nvPr/>
+        </p:nvPicPr>
+        <p:blipFill>
+          <a:blip r:embed="rId3"/>
+          <a:stretch>
+            <a:fillRect/>
+          </a:stretch>
+        </p:blipFill>
+        <p:spPr>
+          <a:xfrm>
+            <a:off x="1341651" y="5164932"/>
+            <a:ext cx="9402991" cy="1180816"/>
+          </a:xfrm>
+          <a:prstGeom prst="rect">
+            <a:avLst/>
+          </a:prstGeom>
+        </p:spPr>
+      </p:pic>
+      <p:pic>
+        <p:nvPicPr>
+          <p:cNvPr id="6" name="Picture 5">
+            <a:extLst>
+              <a:ext uri="{FF2B5EF4-FFF2-40B4-BE49-F238E27FC236}">
+                <a16:creationId xmlns:a16="http://schemas.microsoft.com/office/drawing/2014/main" id="{AC4841E9-75AD-4E56-9098-9BE84C8A5FC0}"/>
+              </a:ext>
+            </a:extLst>
+          </p:cNvPr>
+          <p:cNvPicPr>
+            <a:picLocks noChangeAspect="1"/>
+          </p:cNvPicPr>
+          <p:nvPr/>
+        </p:nvPicPr>
+        <p:blipFill rotWithShape="1">
+          <a:blip r:embed="rId2"/>
+          <a:srcRect t="68809"/>
+          <a:stretch/>
+        </p:blipFill>
+        <p:spPr>
+          <a:xfrm>
+            <a:off x="1409196" y="3088708"/>
+            <a:ext cx="9753004" cy="1751858"/>
+          </a:xfrm>
+          <a:prstGeom prst="rect">
+            <a:avLst/>
+          </a:prstGeom>
+        </p:spPr>
+      </p:pic>
+    </p:spTree>
+    <p:extLst>
+      <p:ext uri="{BB962C8B-B14F-4D97-AF65-F5344CB8AC3E}">
+        <p14:creationId xmlns:p14="http://schemas.microsoft.com/office/powerpoint/2010/main" val="4246052962"/>
+      </p:ext>
+    </p:extLst>
+  </p:cSld>
+  <p:clrMapOvr>
+    <a:masterClrMapping/>
+  </p:clrMapOvr>
+</p:sld>
+</file>
+
+<file path=ppt/slides/slide7.xml><?xml version="1.0" encoding="utf-8"?>
+<p:sld xmlns:a="http://schemas.openxmlformats.org/drawingml/2006/main" xmlns:r="http://schemas.openxmlformats.org/officeDocument/2006/relationships" xmlns:p="http://schemas.openxmlformats.org/presentationml/2006/main">
+  <p:cSld>
+    <p:spTree>
+      <p:nvGrpSpPr>
+        <p:cNvPr id="1" name=""/>
+        <p:cNvGrpSpPr/>
+        <p:nvPr/>
+      </p:nvGrpSpPr>
+      <p:grpSpPr>
+        <a:xfrm>
+          <a:off x="0" y="0"/>
+          <a:ext cx="0" cy="0"/>
+          <a:chOff x="0" y="0"/>
+          <a:chExt cx="0" cy="0"/>
+        </a:xfrm>
+      </p:grpSpPr>
+      <p:sp>
+        <p:nvSpPr>
+          <p:cNvPr id="2" name="Title 1">
+            <a:extLst>
+              <a:ext uri="{FF2B5EF4-FFF2-40B4-BE49-F238E27FC236}">
+                <a16:creationId xmlns:a16="http://schemas.microsoft.com/office/drawing/2014/main" id="{243DE6F1-58CE-45B7-B578-A534B9C1F3BD}"/>
+              </a:ext>
+            </a:extLst>
+          </p:cNvPr>
+          <p:cNvSpPr>
+            <a:spLocks noGrp="1"/>
+          </p:cNvSpPr>
+          <p:nvPr>
+            <p:ph type="title"/>
+          </p:nvPr>
+        </p:nvSpPr>
+        <p:spPr/>
+        <p:txBody>
+          <a:bodyPr/>
+          <a:lstStyle/>
+          <a:p>
+            <a:r>
+              <a:rPr lang="en-GB" dirty="0"/>
+              <a:t>Markdown Language</a:t>
+            </a:r>
+            <a:endParaRPr lang="en-US" dirty="0"/>
+          </a:p>
+        </p:txBody>
+      </p:sp>
+      <p:sp>
+        <p:nvSpPr>
+          <p:cNvPr id="3" name="Content Placeholder 2">
+            <a:extLst>
+              <a:ext uri="{FF2B5EF4-FFF2-40B4-BE49-F238E27FC236}">
+                <a16:creationId xmlns:a16="http://schemas.microsoft.com/office/drawing/2014/main" id="{BA73267A-BF14-4038-80EE-3252C798D872}"/>
+              </a:ext>
+            </a:extLst>
+          </p:cNvPr>
+          <p:cNvSpPr>
+            <a:spLocks noGrp="1"/>
+          </p:cNvSpPr>
+          <p:nvPr>
+            <p:ph idx="1"/>
+          </p:nvPr>
+        </p:nvSpPr>
+        <p:spPr>
+          <a:xfrm>
+            <a:off x="838199" y="1825625"/>
+            <a:ext cx="10887075" cy="4351338"/>
+          </a:xfrm>
+        </p:spPr>
+        <p:txBody>
+          <a:bodyPr/>
+          <a:lstStyle/>
+          <a:p>
+            <a:r>
+              <a:rPr lang="en-GB" dirty="0"/>
+              <a:t>Lightweight mark-up language</a:t>
+            </a:r>
+          </a:p>
+          <a:p>
+            <a:endParaRPr lang="en-GB" dirty="0"/>
+          </a:p>
+          <a:p>
+            <a:r>
+              <a:rPr lang="en-GB" dirty="0"/>
+              <a:t>Basic text formatting, adding images, creating lists, etc.</a:t>
+            </a:r>
+          </a:p>
+          <a:p>
+            <a:endParaRPr lang="en-GB" dirty="0"/>
+          </a:p>
+          <a:p>
+            <a:r>
+              <a:rPr lang="en-GB" dirty="0"/>
+              <a:t>Can </a:t>
+            </a:r>
+            <a:r>
+              <a:rPr lang="en-GB"/>
+              <a:t>embed code and results, </a:t>
+            </a:r>
+            <a:r>
+              <a:rPr lang="en-GB" dirty="0"/>
+              <a:t>making it useful for reproducible research.</a:t>
+            </a:r>
+          </a:p>
+          <a:p>
+            <a:endParaRPr lang="en-GB" dirty="0"/>
+          </a:p>
+          <a:p>
+            <a:r>
+              <a:rPr lang="en-GB" dirty="0"/>
+              <a:t>Looks very much like regular test with a few extra characters (#, *, etc)</a:t>
+            </a:r>
+            <a:endParaRPr lang="en-US" dirty="0"/>
+          </a:p>
+        </p:txBody>
+      </p:sp>
+    </p:spTree>
+    <p:extLst>
+      <p:ext uri="{BB962C8B-B14F-4D97-AF65-F5344CB8AC3E}">
+        <p14:creationId xmlns:p14="http://schemas.microsoft.com/office/powerpoint/2010/main" val="2198983152"/>
+      </p:ext>
+    </p:extLst>
+  </p:cSld>
+  <p:clrMapOvr>
+    <a:masterClrMapping/>
+  </p:clrMapOvr>
+</p:sld>
+</file>
+
+<file path=ppt/slides/slide8.xml><?xml version="1.0" encoding="utf-8"?>
+<p:sld xmlns:a="http://schemas.openxmlformats.org/drawingml/2006/main" xmlns:r="http://schemas.openxmlformats.org/officeDocument/2006/relationships" xmlns:p="http://schemas.openxmlformats.org/presentationml/2006/main">
+  <p:cSld>
+    <p:spTree>
+      <p:nvGrpSpPr>
+        <p:cNvPr id="1" name=""/>
+        <p:cNvGrpSpPr/>
+        <p:nvPr/>
+      </p:nvGrpSpPr>
+      <p:grpSpPr>
+        <a:xfrm>
+          <a:off x="0" y="0"/>
+          <a:ext cx="0" cy="0"/>
+          <a:chOff x="0" y="0"/>
+          <a:chExt cx="0" cy="0"/>
+        </a:xfrm>
+      </p:grpSpPr>
+      <p:sp>
+        <p:nvSpPr>
+          <p:cNvPr id="2" name="Title 1">
+            <a:extLst>
+              <a:ext uri="{FF2B5EF4-FFF2-40B4-BE49-F238E27FC236}">
+                <a16:creationId xmlns:a16="http://schemas.microsoft.com/office/drawing/2014/main" id="{C21FC2A2-9969-430A-990C-7F15BAA6E109}"/>
+              </a:ext>
+            </a:extLst>
+          </p:cNvPr>
+          <p:cNvSpPr>
+            <a:spLocks noGrp="1"/>
+          </p:cNvSpPr>
+          <p:nvPr>
+            <p:ph type="title"/>
+          </p:nvPr>
+        </p:nvSpPr>
+        <p:spPr/>
+        <p:txBody>
+          <a:bodyPr/>
+          <a:lstStyle/>
+          <a:p>
+            <a:endParaRPr lang="en-US"/>
+          </a:p>
+        </p:txBody>
+      </p:sp>
+      <p:sp>
+        <p:nvSpPr>
+          <p:cNvPr id="3" name="Content Placeholder 2">
+            <a:extLst>
+              <a:ext uri="{FF2B5EF4-FFF2-40B4-BE49-F238E27FC236}">
+                <a16:creationId xmlns:a16="http://schemas.microsoft.com/office/drawing/2014/main" id="{953DDED1-61AC-4401-9E54-D83D3125E356}"/>
+              </a:ext>
+            </a:extLst>
+          </p:cNvPr>
+          <p:cNvSpPr>
+            <a:spLocks noGrp="1"/>
+          </p:cNvSpPr>
+          <p:nvPr>
+            <p:ph idx="1"/>
+          </p:nvPr>
+        </p:nvSpPr>
+        <p:spPr/>
+        <p:txBody>
+          <a:bodyPr/>
+          <a:lstStyle/>
+          <a:p>
+            <a:endParaRPr lang="en-US"/>
+          </a:p>
+        </p:txBody>
+      </p:sp>
+      <p:pic>
+        <p:nvPicPr>
+          <p:cNvPr id="4" name="Picture 3">
+            <a:extLst>
+              <a:ext uri="{FF2B5EF4-FFF2-40B4-BE49-F238E27FC236}">
+                <a16:creationId xmlns:a16="http://schemas.microsoft.com/office/drawing/2014/main" id="{230CF898-07E1-439B-8C4C-2F971104267B}"/>
+              </a:ext>
+            </a:extLst>
+          </p:cNvPr>
+          <p:cNvPicPr>
+            <a:picLocks noChangeAspect="1"/>
+          </p:cNvPicPr>
+          <p:nvPr/>
+        </p:nvPicPr>
+        <p:blipFill>
+          <a:blip r:embed="rId2"/>
+          <a:stretch>
+            <a:fillRect/>
+          </a:stretch>
+        </p:blipFill>
+        <p:spPr>
+          <a:xfrm>
+            <a:off x="2114550" y="361950"/>
+            <a:ext cx="7962900" cy="6134100"/>
+          </a:xfrm>
+          <a:prstGeom prst="rect">
+            <a:avLst/>
+          </a:prstGeom>
+        </p:spPr>
+      </p:pic>
+    </p:spTree>
+    <p:extLst>
+      <p:ext uri="{BB962C8B-B14F-4D97-AF65-F5344CB8AC3E}">
+        <p14:creationId xmlns:p14="http://schemas.microsoft.com/office/powerpoint/2010/main" val="1713003587"/>
+      </p:ext>
+    </p:extLst>
+  </p:cSld>
+  <p:clrMapOvr>
+    <a:masterClrMapping/>
+  </p:clrMapOvr>
+</p:sld>
+</file>
+
+<file path=ppt/slides/slide9.xml><?xml version="1.0" encoding="utf-8"?>
+<p:sld xmlns:a="http://schemas.openxmlformats.org/drawingml/2006/main" xmlns:r="http://schemas.openxmlformats.org/officeDocument/2006/relationships" xmlns:p="http://schemas.openxmlformats.org/presentationml/2006/main">
+  <p:cSld>
+    <p:spTree>
+      <p:nvGrpSpPr>
+        <p:cNvPr id="1" name=""/>
+        <p:cNvGrpSpPr/>
+        <p:nvPr/>
+      </p:nvGrpSpPr>
+      <p:grpSpPr>
+        <a:xfrm>
+          <a:off x="0" y="0"/>
+          <a:ext cx="0" cy="0"/>
+          <a:chOff x="0" y="0"/>
+          <a:chExt cx="0" cy="0"/>
+        </a:xfrm>
+      </p:grpSpPr>
+      <p:sp>
+        <p:nvSpPr>
+          <p:cNvPr id="2" name="Title 1">
+            <a:extLst>
+              <a:ext uri="{FF2B5EF4-FFF2-40B4-BE49-F238E27FC236}">
+                <a16:creationId xmlns:a16="http://schemas.microsoft.com/office/drawing/2014/main" id="{35AAFA69-BB11-43C7-BFC3-2D02E205D7D7}"/>
+              </a:ext>
+            </a:extLst>
+          </p:cNvPr>
+          <p:cNvSpPr>
+            <a:spLocks noGrp="1"/>
+          </p:cNvSpPr>
+          <p:nvPr>
+            <p:ph type="title"/>
+          </p:nvPr>
+        </p:nvSpPr>
+        <p:spPr/>
+        <p:txBody>
+          <a:bodyPr/>
+          <a:lstStyle/>
+          <a:p>
+            <a:r>
+              <a:rPr lang="en-GB" dirty="0"/>
+              <a:t>Worked example…</a:t>
+            </a:r>
+            <a:endParaRPr lang="en-US" dirty="0"/>
+          </a:p>
+        </p:txBody>
+      </p:sp>
+    </p:spTree>
+    <p:extLst>
+      <p:ext uri="{BB962C8B-B14F-4D97-AF65-F5344CB8AC3E}">
+        <p14:creationId xmlns:p14="http://schemas.microsoft.com/office/powerpoint/2010/main" val="3287177102"/>
       </p:ext>
     </p:extLst>
   </p:cSld>
@@ -5641,4 +8138,299 @@
     </a:ext>
   </a:extLst>
 </a:theme>
+</file>
+
+<file path=ppt/theme/theme2.xml><?xml version="1.0" encoding="utf-8"?>
+<a:theme xmlns:a="http://schemas.openxmlformats.org/drawingml/2006/main" name="Office Theme">
+  <a:themeElements>
+    <a:clrScheme name="Office">
+      <a:dk1>
+        <a:sysClr val="windowText" lastClr="000000"/>
+      </a:dk1>
+      <a:lt1>
+        <a:sysClr val="window" lastClr="FFFFFF"/>
+      </a:lt1>
+      <a:dk2>
+        <a:srgbClr val="44546A"/>
+      </a:dk2>
+      <a:lt2>
+        <a:srgbClr val="E7E6E6"/>
+      </a:lt2>
+      <a:accent1>
+        <a:srgbClr val="4472C4"/>
+      </a:accent1>
+      <a:accent2>
+        <a:srgbClr val="ED7D31"/>
+      </a:accent2>
+      <a:accent3>
+        <a:srgbClr val="A5A5A5"/>
+      </a:accent3>
+      <a:accent4>
+        <a:srgbClr val="FFC000"/>
+      </a:accent4>
+      <a:accent5>
+        <a:srgbClr val="5B9BD5"/>
+      </a:accent5>
+      <a:accent6>
+        <a:srgbClr val="70AD47"/>
+      </a:accent6>
+      <a:hlink>
+        <a:srgbClr val="0563C1"/>
+      </a:hlink>
+      <a:folHlink>
+        <a:srgbClr val="954F72"/>
+      </a:folHlink>
+    </a:clrScheme>
+    <a:fontScheme name="Office">
+      <a:majorFont>
+        <a:latin typeface="Calibri Light" panose="020F0302020204030204"/>
+        <a:ea typeface=""/>
+        <a:cs typeface=""/>
+        <a:font script="Jpan" typeface="游ゴシック Light"/>
+        <a:font script="Hang" typeface="맑은 고딕"/>
+        <a:font script="Hans" typeface="等线 Light"/>
+        <a:font script="Hant" typeface="新細明體"/>
+        <a:font script="Arab" typeface="Times New Roman"/>
+        <a:font script="Hebr" typeface="Times New Roman"/>
+        <a:font script="Thai" typeface="Angsana New"/>
+        <a:font script="Ethi" typeface="Nyala"/>
+        <a:font script="Beng" typeface="Vrinda"/>
+        <a:font script="Gujr" typeface="Shruti"/>
+        <a:font script="Khmr" typeface="MoolBoran"/>
+        <a:font script="Knda" typeface="Tunga"/>
+        <a:font script="Guru" typeface="Raavi"/>
+        <a:font script="Cans" typeface="Euphemia"/>
+        <a:font script="Cher" typeface="Plantagenet Cherokee"/>
+        <a:font script="Yiii" typeface="Microsoft Yi Baiti"/>
+        <a:font script="Tibt" typeface="Microsoft Himalaya"/>
+        <a:font script="Thaa" typeface="MV Boli"/>
+        <a:font script="Deva" typeface="Mangal"/>
+        <a:font script="Telu" typeface="Gautami"/>
+        <a:font script="Taml" typeface="Latha"/>
+        <a:font script="Syrc" typeface="Estrangelo Edessa"/>
+        <a:font script="Orya" typeface="Kalinga"/>
+        <a:font script="Mlym" typeface="Kartika"/>
+        <a:font script="Laoo" typeface="DokChampa"/>
+        <a:font script="Sinh" typeface="Iskoola Pota"/>
+        <a:font script="Mong" typeface="Mongolian Baiti"/>
+        <a:font script="Viet" typeface="Times New Roman"/>
+        <a:font script="Uigh" typeface="Microsoft Uighur"/>
+        <a:font script="Geor" typeface="Sylfaen"/>
+        <a:font script="Armn" typeface="Arial"/>
+        <a:font script="Bugi" typeface="Leelawadee UI"/>
+        <a:font script="Bopo" typeface="Microsoft JhengHei"/>
+        <a:font script="Java" typeface="Javanese Text"/>
+        <a:font script="Lisu" typeface="Segoe UI"/>
+        <a:font script="Mymr" typeface="Myanmar Text"/>
+        <a:font script="Nkoo" typeface="Ebrima"/>
+        <a:font script="Olck" typeface="Nirmala UI"/>
+        <a:font script="Osma" typeface="Ebrima"/>
+        <a:font script="Phag" typeface="Phagspa"/>
+        <a:font script="Syrn" typeface="Estrangelo Edessa"/>
+        <a:font script="Syrj" typeface="Estrangelo Edessa"/>
+        <a:font script="Syre" typeface="Estrangelo Edessa"/>
+        <a:font script="Sora" typeface="Nirmala UI"/>
+        <a:font script="Tale" typeface="Microsoft Tai Le"/>
+        <a:font script="Talu" typeface="Microsoft New Tai Lue"/>
+        <a:font script="Tfng" typeface="Ebrima"/>
+      </a:majorFont>
+      <a:minorFont>
+        <a:latin typeface="Calibri" panose="020F0502020204030204"/>
+        <a:ea typeface=""/>
+        <a:cs typeface=""/>
+        <a:font script="Jpan" typeface="游ゴシック"/>
+        <a:font script="Hang" typeface="맑은 고딕"/>
+        <a:font script="Hans" typeface="等线"/>
+        <a:font script="Hant" typeface="新細明體"/>
+        <a:font script="Arab" typeface="Arial"/>
+        <a:font script="Hebr" typeface="Arial"/>
+        <a:font script="Thai" typeface="Cordia New"/>
+        <a:font script="Ethi" typeface="Nyala"/>
+        <a:font script="Beng" typeface="Vrinda"/>
+        <a:font script="Gujr" typeface="Shruti"/>
+        <a:font script="Khmr" typeface="DaunPenh"/>
+        <a:font script="Knda" typeface="Tunga"/>
+        <a:font script="Guru" typeface="Raavi"/>
+        <a:font script="Cans" typeface="Euphemia"/>
+        <a:font script="Cher" typeface="Plantagenet Cherokee"/>
+        <a:font script="Yiii" typeface="Microsoft Yi Baiti"/>
+        <a:font script="Tibt" typeface="Microsoft Himalaya"/>
+        <a:font script="Thaa" typeface="MV Boli"/>
+        <a:font script="Deva" typeface="Mangal"/>
+        <a:font script="Telu" typeface="Gautami"/>
+        <a:font script="Taml" typeface="Latha"/>
+        <a:font script="Syrc" typeface="Estrangelo Edessa"/>
+        <a:font script="Orya" typeface="Kalinga"/>
+        <a:font script="Mlym" typeface="Kartika"/>
+        <a:font script="Laoo" typeface="DokChampa"/>
+        <a:font script="Sinh" typeface="Iskoola Pota"/>
+        <a:font script="Mong" typeface="Mongolian Baiti"/>
+        <a:font script="Viet" typeface="Arial"/>
+        <a:font script="Uigh" typeface="Microsoft Uighur"/>
+        <a:font script="Geor" typeface="Sylfaen"/>
+        <a:font script="Armn" typeface="Arial"/>
+        <a:font script="Bugi" typeface="Leelawadee UI"/>
+        <a:font script="Bopo" typeface="Microsoft JhengHei"/>
+        <a:font script="Java" typeface="Javanese Text"/>
+        <a:font script="Lisu" typeface="Segoe UI"/>
+        <a:font script="Mymr" typeface="Myanmar Text"/>
+        <a:font script="Nkoo" typeface="Ebrima"/>
+        <a:font script="Olck" typeface="Nirmala UI"/>
+        <a:font script="Osma" typeface="Ebrima"/>
+        <a:font script="Phag" typeface="Phagspa"/>
+        <a:font script="Syrn" typeface="Estrangelo Edessa"/>
+        <a:font script="Syrj" typeface="Estrangelo Edessa"/>
+        <a:font script="Syre" typeface="Estrangelo Edessa"/>
+        <a:font script="Sora" typeface="Nirmala UI"/>
+        <a:font script="Tale" typeface="Microsoft Tai Le"/>
+        <a:font script="Talu" typeface="Microsoft New Tai Lue"/>
+        <a:font script="Tfng" typeface="Ebrima"/>
+      </a:minorFont>
+    </a:fontScheme>
+    <a:fmtScheme name="Office">
+      <a:fillStyleLst>
+        <a:solidFill>
+          <a:schemeClr val="phClr"/>
+        </a:solidFill>
+        <a:gradFill rotWithShape="1">
+          <a:gsLst>
+            <a:gs pos="0">
+              <a:schemeClr val="phClr">
+                <a:lumMod val="110000"/>
+                <a:satMod val="105000"/>
+                <a:tint val="67000"/>
+              </a:schemeClr>
+            </a:gs>
+            <a:gs pos="50000">
+              <a:schemeClr val="phClr">
+                <a:lumMod val="105000"/>
+                <a:satMod val="103000"/>
+                <a:tint val="73000"/>
+              </a:schemeClr>
+            </a:gs>
+            <a:gs pos="100000">
+              <a:schemeClr val="phClr">
+                <a:lumMod val="105000"/>
+                <a:satMod val="109000"/>
+                <a:tint val="81000"/>
+              </a:schemeClr>
+            </a:gs>
+          </a:gsLst>
+          <a:lin ang="5400000" scaled="0"/>
+        </a:gradFill>
+        <a:gradFill rotWithShape="1">
+          <a:gsLst>
+            <a:gs pos="0">
+              <a:schemeClr val="phClr">
+                <a:satMod val="103000"/>
+                <a:lumMod val="102000"/>
+                <a:tint val="94000"/>
+              </a:schemeClr>
+            </a:gs>
+            <a:gs pos="50000">
+              <a:schemeClr val="phClr">
+                <a:satMod val="110000"/>
+                <a:lumMod val="100000"/>
+                <a:shade val="100000"/>
+              </a:schemeClr>
+            </a:gs>
+            <a:gs pos="100000">
+              <a:schemeClr val="phClr">
+                <a:lumMod val="99000"/>
+                <a:satMod val="120000"/>
+                <a:shade val="78000"/>
+              </a:schemeClr>
+            </a:gs>
+          </a:gsLst>
+          <a:lin ang="5400000" scaled="0"/>
+        </a:gradFill>
+      </a:fillStyleLst>
+      <a:lnStyleLst>
+        <a:ln w="6350" cap="flat" cmpd="sng" algn="ctr">
+          <a:solidFill>
+            <a:schemeClr val="phClr"/>
+          </a:solidFill>
+          <a:prstDash val="solid"/>
+          <a:miter lim="800000"/>
+        </a:ln>
+        <a:ln w="12700" cap="flat" cmpd="sng" algn="ctr">
+          <a:solidFill>
+            <a:schemeClr val="phClr"/>
+          </a:solidFill>
+          <a:prstDash val="solid"/>
+          <a:miter lim="800000"/>
+        </a:ln>
+        <a:ln w="19050" cap="flat" cmpd="sng" algn="ctr">
+          <a:solidFill>
+            <a:schemeClr val="phClr"/>
+          </a:solidFill>
+          <a:prstDash val="solid"/>
+          <a:miter lim="800000"/>
+        </a:ln>
+      </a:lnStyleLst>
+      <a:effectStyleLst>
+        <a:effectStyle>
+          <a:effectLst/>
+        </a:effectStyle>
+        <a:effectStyle>
+          <a:effectLst/>
+        </a:effectStyle>
+        <a:effectStyle>
+          <a:effectLst>
+            <a:outerShdw blurRad="57150" dist="19050" dir="5400000" algn="ctr" rotWithShape="0">
+              <a:srgbClr val="000000">
+                <a:alpha val="63000"/>
+              </a:srgbClr>
+            </a:outerShdw>
+          </a:effectLst>
+        </a:effectStyle>
+      </a:effectStyleLst>
+      <a:bgFillStyleLst>
+        <a:solidFill>
+          <a:schemeClr val="phClr"/>
+        </a:solidFill>
+        <a:solidFill>
+          <a:schemeClr val="phClr">
+            <a:tint val="95000"/>
+            <a:satMod val="170000"/>
+          </a:schemeClr>
+        </a:solidFill>
+        <a:gradFill rotWithShape="1">
+          <a:gsLst>
+            <a:gs pos="0">
+              <a:schemeClr val="phClr">
+                <a:tint val="93000"/>
+                <a:satMod val="150000"/>
+                <a:shade val="98000"/>
+                <a:lumMod val="102000"/>
+              </a:schemeClr>
+            </a:gs>
+            <a:gs pos="50000">
+              <a:schemeClr val="phClr">
+                <a:tint val="98000"/>
+                <a:satMod val="130000"/>
+                <a:shade val="90000"/>
+                <a:lumMod val="103000"/>
+              </a:schemeClr>
+            </a:gs>
+            <a:gs pos="100000">
+              <a:schemeClr val="phClr">
+                <a:shade val="63000"/>
+                <a:satMod val="120000"/>
+              </a:schemeClr>
+            </a:gs>
+          </a:gsLst>
+          <a:lin ang="5400000" scaled="0"/>
+        </a:gradFill>
+      </a:bgFillStyleLst>
+    </a:fmtScheme>
+  </a:themeElements>
+  <a:objectDefaults/>
+  <a:extraClrSchemeLst/>
+  <a:extLst>
+    <a:ext uri="{05A4C25C-085E-4340-85A3-A5531E510DB2}">
+      <thm15:themeFamily xmlns:thm15="http://schemas.microsoft.com/office/thememl/2012/main" name="Office Theme" id="{62F939B6-93AF-4DB8-9C6B-D6C7DFDC589F}" vid="{4A3C46E8-61CC-4603-A589-7422A47A8E4A}"/>
+    </a:ext>
+  </a:extLst>
+</a:theme>
 </file>
</xml_diff>